<commit_message>
Run different tests and added plots to "Prezentacja_finalna"
</commit_message>
<xml_diff>
--- a/ExpresswaySimulation/doc/Prezentacja_finalna.pptx
+++ b/ExpresswaySimulation/doc/Prezentacja_finalna.pptx
@@ -5,18 +5,33 @@
     <p:sldMasterId id="2147483648" r:id="rId1"/>
   </p:sldMasterIdLst>
   <p:notesMasterIdLst>
-    <p:notesMasterId r:id="rId11"/>
+    <p:notesMasterId r:id="rId26"/>
   </p:notesMasterIdLst>
   <p:sldIdLst>
     <p:sldId id="256" r:id="rId2"/>
     <p:sldId id="258" r:id="rId3"/>
     <p:sldId id="259" r:id="rId4"/>
     <p:sldId id="261" r:id="rId5"/>
-    <p:sldId id="260" r:id="rId6"/>
-    <p:sldId id="262" r:id="rId7"/>
-    <p:sldId id="263" r:id="rId8"/>
-    <p:sldId id="265" r:id="rId9"/>
-    <p:sldId id="264" r:id="rId10"/>
+    <p:sldId id="265" r:id="rId6"/>
+    <p:sldId id="260" r:id="rId7"/>
+    <p:sldId id="266" r:id="rId8"/>
+    <p:sldId id="267" r:id="rId9"/>
+    <p:sldId id="268" r:id="rId10"/>
+    <p:sldId id="270" r:id="rId11"/>
+    <p:sldId id="271" r:id="rId12"/>
+    <p:sldId id="273" r:id="rId13"/>
+    <p:sldId id="272" r:id="rId14"/>
+    <p:sldId id="274" r:id="rId15"/>
+    <p:sldId id="275" r:id="rId16"/>
+    <p:sldId id="276" r:id="rId17"/>
+    <p:sldId id="277" r:id="rId18"/>
+    <p:sldId id="278" r:id="rId19"/>
+    <p:sldId id="279" r:id="rId20"/>
+    <p:sldId id="280" r:id="rId21"/>
+    <p:sldId id="281" r:id="rId22"/>
+    <p:sldId id="282" r:id="rId23"/>
+    <p:sldId id="283" r:id="rId24"/>
+    <p:sldId id="264" r:id="rId25"/>
   </p:sldIdLst>
   <p:sldSz cx="12192000" cy="6858000"/>
   <p:notesSz cx="6858000" cy="9144000"/>
@@ -117,7 +132,7 @@
   </p:defaultTextStyle>
   <p:extLst>
     <p:ext uri="{EFAFB233-063F-42B5-8137-9DF3F51BA10A}">
-      <p15:sldGuideLst xmlns:p15="http://schemas.microsoft.com/office/powerpoint/2012/main" xmlns=""/>
+      <p15:sldGuideLst xmlns="" xmlns:p15="http://schemas.microsoft.com/office/powerpoint/2012/main"/>
     </p:ext>
   </p:extLst>
 </p:presentation>
@@ -205,7 +220,8 @@
           <a:p>
             <a:fld id="{27B2FAC4-8D68-4EF0-B25F-1BD5B97A2B63}" type="datetimeFigureOut">
               <a:rPr lang="pl-PL"/>
-              <a:t>2017-06-13</a:t>
+              <a:pPr/>
+              <a:t>2017-06-14</a:t>
             </a:fld>
             <a:endParaRPr lang="pl-PL"/>
           </a:p>
@@ -363,6 +379,7 @@
           <a:p>
             <a:fld id="{04564509-38F4-4F3E-878E-9346C38E77B8}" type="slidenum">
               <a:rPr lang="pl-PL"/>
+              <a:pPr/>
               <a:t>‹#›</a:t>
             </a:fld>
             <a:endParaRPr lang="pl-PL"/>
@@ -372,7 +389,7 @@
     </p:spTree>
     <p:extLst>
       <p:ext uri="{BB962C8B-B14F-4D97-AF65-F5344CB8AC3E}">
-        <p14:creationId xmlns:p14="http://schemas.microsoft.com/office/powerpoint/2010/main" val="2179404160"/>
+        <p14:creationId xmlns:p14="http://schemas.microsoft.com/office/powerpoint/2010/main" xmlns="" val="2179404160"/>
       </p:ext>
     </p:extLst>
   </p:cSld>
@@ -537,6 +554,7 @@
           <a:p>
             <a:fld id="{04564509-38F4-4F3E-878E-9346C38E77B8}" type="slidenum">
               <a:rPr lang="pl-PL"/>
+              <a:pPr/>
               <a:t>2</a:t>
             </a:fld>
             <a:endParaRPr lang="pl-PL"/>
@@ -546,7 +564,7 @@
     </p:spTree>
     <p:extLst>
       <p:ext uri="{BB962C8B-B14F-4D97-AF65-F5344CB8AC3E}">
-        <p14:creationId xmlns:p14="http://schemas.microsoft.com/office/powerpoint/2010/main" val="4051804097"/>
+        <p14:creationId xmlns:p14="http://schemas.microsoft.com/office/powerpoint/2010/main" xmlns="" val="4051804097"/>
       </p:ext>
     </p:extLst>
   </p:cSld>
@@ -621,6 +639,7 @@
           <a:p>
             <a:fld id="{04564509-38F4-4F3E-878E-9346C38E77B8}" type="slidenum">
               <a:rPr lang="pl-PL"/>
+              <a:pPr/>
               <a:t>3</a:t>
             </a:fld>
             <a:endParaRPr lang="pl-PL"/>
@@ -630,7 +649,7 @@
     </p:spTree>
     <p:extLst>
       <p:ext uri="{BB962C8B-B14F-4D97-AF65-F5344CB8AC3E}">
-        <p14:creationId xmlns:p14="http://schemas.microsoft.com/office/powerpoint/2010/main" val="3552026021"/>
+        <p14:creationId xmlns:p14="http://schemas.microsoft.com/office/powerpoint/2010/main" xmlns="" val="3552026021"/>
       </p:ext>
     </p:extLst>
   </p:cSld>
@@ -705,6 +724,7 @@
           <a:p>
             <a:fld id="{04564509-38F4-4F3E-878E-9346C38E77B8}" type="slidenum">
               <a:rPr lang="pl-PL"/>
+              <a:pPr/>
               <a:t>4</a:t>
             </a:fld>
             <a:endParaRPr lang="pl-PL"/>
@@ -714,7 +734,7 @@
     </p:spTree>
     <p:extLst>
       <p:ext uri="{BB962C8B-B14F-4D97-AF65-F5344CB8AC3E}">
-        <p14:creationId xmlns:p14="http://schemas.microsoft.com/office/powerpoint/2010/main" val="1884400495"/>
+        <p14:creationId xmlns:p14="http://schemas.microsoft.com/office/powerpoint/2010/main" xmlns="" val="1884400495"/>
       </p:ext>
     </p:extLst>
   </p:cSld>
@@ -789,7 +809,8 @@
           <a:p>
             <a:fld id="{04564509-38F4-4F3E-878E-9346C38E77B8}" type="slidenum">
               <a:rPr lang="pl-PL"/>
-              <a:t>5</a:t>
+              <a:pPr/>
+              <a:t>6</a:t>
             </a:fld>
             <a:endParaRPr lang="pl-PL"/>
           </a:p>
@@ -798,7 +819,7 @@
     </p:spTree>
     <p:extLst>
       <p:ext uri="{BB962C8B-B14F-4D97-AF65-F5344CB8AC3E}">
-        <p14:creationId xmlns:p14="http://schemas.microsoft.com/office/powerpoint/2010/main" val="319444595"/>
+        <p14:creationId xmlns:p14="http://schemas.microsoft.com/office/powerpoint/2010/main" xmlns="" val="319444595"/>
       </p:ext>
     </p:extLst>
   </p:cSld>
@@ -873,7 +894,8 @@
           <a:p>
             <a:fld id="{04564509-38F4-4F3E-878E-9346C38E77B8}" type="slidenum">
               <a:rPr lang="pl-PL"/>
-              <a:t>6</a:t>
+              <a:pPr/>
+              <a:t>24</a:t>
             </a:fld>
             <a:endParaRPr lang="pl-PL"/>
           </a:p>
@@ -882,175 +904,7 @@
     </p:spTree>
     <p:extLst>
       <p:ext uri="{BB962C8B-B14F-4D97-AF65-F5344CB8AC3E}">
-        <p14:creationId xmlns:p14="http://schemas.microsoft.com/office/powerpoint/2010/main" val="2971246701"/>
-      </p:ext>
-    </p:extLst>
-  </p:cSld>
-  <p:clrMapOvr>
-    <a:masterClrMapping/>
-  </p:clrMapOvr>
-</p:notes>
-</file>
-
-<file path=ppt/notesSlides/notesSlide6.xml><?xml version="1.0" encoding="utf-8"?>
-<p:notes xmlns:a="http://schemas.openxmlformats.org/drawingml/2006/main" xmlns:r="http://schemas.openxmlformats.org/officeDocument/2006/relationships" xmlns:p="http://schemas.openxmlformats.org/presentationml/2006/main">
-  <p:cSld>
-    <p:spTree>
-      <p:nvGrpSpPr>
-        <p:cNvPr id="1" name=""/>
-        <p:cNvGrpSpPr/>
-        <p:nvPr/>
-      </p:nvGrpSpPr>
-      <p:grpSpPr>
-        <a:xfrm>
-          <a:off x="0" y="0"/>
-          <a:ext cx="0" cy="0"/>
-          <a:chOff x="0" y="0"/>
-          <a:chExt cx="0" cy="0"/>
-        </a:xfrm>
-      </p:grpSpPr>
-      <p:sp>
-        <p:nvSpPr>
-          <p:cNvPr id="2" name="Symbol zastępczy obrazu slajdu 1"/>
-          <p:cNvSpPr>
-            <a:spLocks noGrp="1" noRot="1" noChangeAspect="1"/>
-          </p:cNvSpPr>
-          <p:nvPr>
-            <p:ph type="sldImg"/>
-          </p:nvPr>
-        </p:nvSpPr>
-        <p:spPr/>
-      </p:sp>
-      <p:sp>
-        <p:nvSpPr>
-          <p:cNvPr id="3" name="Symbol zastępczy notatek 2"/>
-          <p:cNvSpPr>
-            <a:spLocks noGrp="1"/>
-          </p:cNvSpPr>
-          <p:nvPr>
-            <p:ph type="body" idx="1"/>
-          </p:nvPr>
-        </p:nvSpPr>
-        <p:spPr/>
-        <p:txBody>
-          <a:bodyPr/>
-          <a:lstStyle/>
-          <a:p>
-            <a:endParaRPr lang="pl-PL"/>
-          </a:p>
-        </p:txBody>
-      </p:sp>
-      <p:sp>
-        <p:nvSpPr>
-          <p:cNvPr id="4" name="Symbol zastępczy numeru slajdu 3"/>
-          <p:cNvSpPr>
-            <a:spLocks noGrp="1"/>
-          </p:cNvSpPr>
-          <p:nvPr>
-            <p:ph type="sldNum" sz="quarter" idx="10"/>
-          </p:nvPr>
-        </p:nvSpPr>
-        <p:spPr/>
-        <p:txBody>
-          <a:bodyPr/>
-          <a:lstStyle/>
-          <a:p>
-            <a:fld id="{04564509-38F4-4F3E-878E-9346C38E77B8}" type="slidenum">
-              <a:rPr lang="pl-PL"/>
-              <a:t>7</a:t>
-            </a:fld>
-            <a:endParaRPr lang="pl-PL"/>
-          </a:p>
-        </p:txBody>
-      </p:sp>
-    </p:spTree>
-    <p:extLst>
-      <p:ext uri="{BB962C8B-B14F-4D97-AF65-F5344CB8AC3E}">
-        <p14:creationId xmlns:p14="http://schemas.microsoft.com/office/powerpoint/2010/main" val="1849647383"/>
-      </p:ext>
-    </p:extLst>
-  </p:cSld>
-  <p:clrMapOvr>
-    <a:masterClrMapping/>
-  </p:clrMapOvr>
-</p:notes>
-</file>
-
-<file path=ppt/notesSlides/notesSlide7.xml><?xml version="1.0" encoding="utf-8"?>
-<p:notes xmlns:a="http://schemas.openxmlformats.org/drawingml/2006/main" xmlns:r="http://schemas.openxmlformats.org/officeDocument/2006/relationships" xmlns:p="http://schemas.openxmlformats.org/presentationml/2006/main">
-  <p:cSld>
-    <p:spTree>
-      <p:nvGrpSpPr>
-        <p:cNvPr id="1" name=""/>
-        <p:cNvGrpSpPr/>
-        <p:nvPr/>
-      </p:nvGrpSpPr>
-      <p:grpSpPr>
-        <a:xfrm>
-          <a:off x="0" y="0"/>
-          <a:ext cx="0" cy="0"/>
-          <a:chOff x="0" y="0"/>
-          <a:chExt cx="0" cy="0"/>
-        </a:xfrm>
-      </p:grpSpPr>
-      <p:sp>
-        <p:nvSpPr>
-          <p:cNvPr id="2" name="Symbol zastępczy obrazu slajdu 1"/>
-          <p:cNvSpPr>
-            <a:spLocks noGrp="1" noRot="1" noChangeAspect="1"/>
-          </p:cNvSpPr>
-          <p:nvPr>
-            <p:ph type="sldImg"/>
-          </p:nvPr>
-        </p:nvSpPr>
-        <p:spPr/>
-      </p:sp>
-      <p:sp>
-        <p:nvSpPr>
-          <p:cNvPr id="3" name="Symbol zastępczy notatek 2"/>
-          <p:cNvSpPr>
-            <a:spLocks noGrp="1"/>
-          </p:cNvSpPr>
-          <p:nvPr>
-            <p:ph type="body" idx="1"/>
-          </p:nvPr>
-        </p:nvSpPr>
-        <p:spPr/>
-        <p:txBody>
-          <a:bodyPr/>
-          <a:lstStyle/>
-          <a:p>
-            <a:endParaRPr lang="pl-PL"/>
-          </a:p>
-        </p:txBody>
-      </p:sp>
-      <p:sp>
-        <p:nvSpPr>
-          <p:cNvPr id="4" name="Symbol zastępczy numeru slajdu 3"/>
-          <p:cNvSpPr>
-            <a:spLocks noGrp="1"/>
-          </p:cNvSpPr>
-          <p:nvPr>
-            <p:ph type="sldNum" sz="quarter" idx="10"/>
-          </p:nvPr>
-        </p:nvSpPr>
-        <p:spPr/>
-        <p:txBody>
-          <a:bodyPr/>
-          <a:lstStyle/>
-          <a:p>
-            <a:fld id="{04564509-38F4-4F3E-878E-9346C38E77B8}" type="slidenum">
-              <a:rPr lang="pl-PL"/>
-              <a:t>9</a:t>
-            </a:fld>
-            <a:endParaRPr lang="pl-PL"/>
-          </a:p>
-        </p:txBody>
-      </p:sp>
-    </p:spTree>
-    <p:extLst>
-      <p:ext uri="{BB962C8B-B14F-4D97-AF65-F5344CB8AC3E}">
-        <p14:creationId xmlns:p14="http://schemas.microsoft.com/office/powerpoint/2010/main" val="494450788"/>
+        <p14:creationId xmlns:p14="http://schemas.microsoft.com/office/powerpoint/2010/main" xmlns="" val="494450788"/>
       </p:ext>
     </p:extLst>
   </p:cSld>
@@ -1090,7 +944,7 @@
             <a:alphaModFix amt="30000"/>
             <a:extLst>
               <a:ext uri="{28A0092B-C50C-407E-A947-70E740481C1C}">
-                <a14:useLocalDpi xmlns:a14="http://schemas.microsoft.com/office/drawing/2010/main" val="0"/>
+                <a14:useLocalDpi xmlns:a14="http://schemas.microsoft.com/office/drawing/2010/main" xmlns="" val="0"/>
               </a:ext>
             </a:extLst>
           </a:blip>
@@ -1110,7 +964,7 @@
           <a:noFill/>
           <a:extLst>
             <a:ext uri="{909E8E84-426E-40DD-AFC4-6F175D3DCCD1}">
-              <a14:hiddenFill xmlns:a14="http://schemas.microsoft.com/office/drawing/2010/main">
+              <a14:hiddenFill xmlns:a14="http://schemas.microsoft.com/office/drawing/2010/main" xmlns="">
                 <a:solidFill>
                   <a:srgbClr val="FFFFFF"/>
                 </a:solidFill>
@@ -1170,7 +1024,7 @@
             </a:ln>
             <a:extLst>
               <a:ext uri="{91240B29-F687-4F45-9708-019B960494DF}">
-                <a14:hiddenLine xmlns:a14="http://schemas.microsoft.com/office/drawing/2010/main" w="9525">
+                <a14:hiddenLine xmlns:a14="http://schemas.microsoft.com/office/drawing/2010/main" xmlns="" w="9525">
                   <a:solidFill>
                     <a:srgbClr val="000000"/>
                   </a:solidFill>
@@ -1260,7 +1114,7 @@
             </a:ln>
             <a:extLst>
               <a:ext uri="{91240B29-F687-4F45-9708-019B960494DF}">
-                <a14:hiddenLine xmlns:a14="http://schemas.microsoft.com/office/drawing/2010/main" w="9525">
+                <a14:hiddenLine xmlns:a14="http://schemas.microsoft.com/office/drawing/2010/main" xmlns="" w="9525">
                   <a:solidFill>
                     <a:srgbClr val="000000"/>
                   </a:solidFill>
@@ -1350,7 +1204,7 @@
             </a:ln>
             <a:extLst>
               <a:ext uri="{91240B29-F687-4F45-9708-019B960494DF}">
-                <a14:hiddenLine xmlns:a14="http://schemas.microsoft.com/office/drawing/2010/main" w="9525">
+                <a14:hiddenLine xmlns:a14="http://schemas.microsoft.com/office/drawing/2010/main" xmlns="" w="9525">
                   <a:solidFill>
                     <a:srgbClr val="000000"/>
                   </a:solidFill>
@@ -1384,7 +1238,7 @@
             </a:ln>
             <a:extLst>
               <a:ext uri="{91240B29-F687-4F45-9708-019B960494DF}">
-                <a14:hiddenLine xmlns:a14="http://schemas.microsoft.com/office/drawing/2010/main" w="9525">
+                <a14:hiddenLine xmlns:a14="http://schemas.microsoft.com/office/drawing/2010/main" xmlns="" w="9525">
                   <a:solidFill>
                     <a:srgbClr val="000000"/>
                   </a:solidFill>
@@ -1474,7 +1328,7 @@
             </a:ln>
             <a:extLst>
               <a:ext uri="{91240B29-F687-4F45-9708-019B960494DF}">
-                <a14:hiddenLine xmlns:a14="http://schemas.microsoft.com/office/drawing/2010/main" w="9525">
+                <a14:hiddenLine xmlns:a14="http://schemas.microsoft.com/office/drawing/2010/main" xmlns="" w="9525">
                   <a:solidFill>
                     <a:srgbClr val="000000"/>
                   </a:solidFill>
@@ -1536,7 +1390,7 @@
             </a:ln>
             <a:extLst>
               <a:ext uri="{91240B29-F687-4F45-9708-019B960494DF}">
-                <a14:hiddenLine xmlns:a14="http://schemas.microsoft.com/office/drawing/2010/main" w="9525">
+                <a14:hiddenLine xmlns:a14="http://schemas.microsoft.com/office/drawing/2010/main" xmlns="" w="9525">
                   <a:solidFill>
                     <a:srgbClr val="000000"/>
                   </a:solidFill>
@@ -1598,7 +1452,7 @@
             </a:ln>
             <a:extLst>
               <a:ext uri="{91240B29-F687-4F45-9708-019B960494DF}">
-                <a14:hiddenLine xmlns:a14="http://schemas.microsoft.com/office/drawing/2010/main" w="9525">
+                <a14:hiddenLine xmlns:a14="http://schemas.microsoft.com/office/drawing/2010/main" xmlns="" w="9525">
                   <a:solidFill>
                     <a:srgbClr val="000000"/>
                   </a:solidFill>
@@ -1688,7 +1542,7 @@
             </a:ln>
             <a:extLst>
               <a:ext uri="{91240B29-F687-4F45-9708-019B960494DF}">
-                <a14:hiddenLine xmlns:a14="http://schemas.microsoft.com/office/drawing/2010/main" w="9525">
+                <a14:hiddenLine xmlns:a14="http://schemas.microsoft.com/office/drawing/2010/main" xmlns="" w="9525">
                   <a:solidFill>
                     <a:srgbClr val="000000"/>
                   </a:solidFill>
@@ -1750,7 +1604,7 @@
             </a:ln>
             <a:extLst>
               <a:ext uri="{91240B29-F687-4F45-9708-019B960494DF}">
-                <a14:hiddenLine xmlns:a14="http://schemas.microsoft.com/office/drawing/2010/main" w="9525">
+                <a14:hiddenLine xmlns:a14="http://schemas.microsoft.com/office/drawing/2010/main" xmlns="" w="9525">
                   <a:solidFill>
                     <a:srgbClr val="000000"/>
                   </a:solidFill>
@@ -1812,7 +1666,7 @@
             </a:ln>
             <a:extLst>
               <a:ext uri="{91240B29-F687-4F45-9708-019B960494DF}">
-                <a14:hiddenLine xmlns:a14="http://schemas.microsoft.com/office/drawing/2010/main" w="9525">
+                <a14:hiddenLine xmlns:a14="http://schemas.microsoft.com/office/drawing/2010/main" xmlns="" w="9525">
                   <a:solidFill>
                     <a:srgbClr val="000000"/>
                   </a:solidFill>
@@ -1902,7 +1756,7 @@
             </a:ln>
             <a:extLst>
               <a:ext uri="{91240B29-F687-4F45-9708-019B960494DF}">
-                <a14:hiddenLine xmlns:a14="http://schemas.microsoft.com/office/drawing/2010/main" w="9525">
+                <a14:hiddenLine xmlns:a14="http://schemas.microsoft.com/office/drawing/2010/main" xmlns="" w="9525">
                   <a:solidFill>
                     <a:srgbClr val="000000"/>
                   </a:solidFill>
@@ -1992,7 +1846,7 @@
             </a:ln>
             <a:extLst>
               <a:ext uri="{91240B29-F687-4F45-9708-019B960494DF}">
-                <a14:hiddenLine xmlns:a14="http://schemas.microsoft.com/office/drawing/2010/main" w="9525">
+                <a14:hiddenLine xmlns:a14="http://schemas.microsoft.com/office/drawing/2010/main" xmlns="" w="9525">
                   <a:solidFill>
                     <a:srgbClr val="000000"/>
                   </a:solidFill>
@@ -2054,7 +1908,7 @@
             </a:ln>
             <a:extLst>
               <a:ext uri="{91240B29-F687-4F45-9708-019B960494DF}">
-                <a14:hiddenLine xmlns:a14="http://schemas.microsoft.com/office/drawing/2010/main" w="9525">
+                <a14:hiddenLine xmlns:a14="http://schemas.microsoft.com/office/drawing/2010/main" xmlns="" w="9525">
                   <a:solidFill>
                     <a:srgbClr val="000000"/>
                   </a:solidFill>
@@ -2164,7 +2018,7 @@
             </a:ln>
             <a:extLst>
               <a:ext uri="{91240B29-F687-4F45-9708-019B960494DF}">
-                <a14:hiddenLine xmlns:a14="http://schemas.microsoft.com/office/drawing/2010/main" w="9525">
+                <a14:hiddenLine xmlns:a14="http://schemas.microsoft.com/office/drawing/2010/main" xmlns="" w="9525">
                   <a:solidFill>
                     <a:srgbClr val="000000"/>
                   </a:solidFill>
@@ -2226,7 +2080,7 @@
             </a:ln>
             <a:extLst>
               <a:ext uri="{91240B29-F687-4F45-9708-019B960494DF}">
-                <a14:hiddenLine xmlns:a14="http://schemas.microsoft.com/office/drawing/2010/main" w="9525">
+                <a14:hiddenLine xmlns:a14="http://schemas.microsoft.com/office/drawing/2010/main" xmlns="" w="9525">
                   <a:solidFill>
                     <a:srgbClr val="000000"/>
                   </a:solidFill>
@@ -2316,7 +2170,7 @@
             </a:ln>
             <a:extLst>
               <a:ext uri="{91240B29-F687-4F45-9708-019B960494DF}">
-                <a14:hiddenLine xmlns:a14="http://schemas.microsoft.com/office/drawing/2010/main" w="9525">
+                <a14:hiddenLine xmlns:a14="http://schemas.microsoft.com/office/drawing/2010/main" xmlns="" w="9525">
                   <a:solidFill>
                     <a:srgbClr val="000000"/>
                   </a:solidFill>
@@ -2406,7 +2260,7 @@
             </a:ln>
             <a:extLst>
               <a:ext uri="{91240B29-F687-4F45-9708-019B960494DF}">
-                <a14:hiddenLine xmlns:a14="http://schemas.microsoft.com/office/drawing/2010/main" w="9525">
+                <a14:hiddenLine xmlns:a14="http://schemas.microsoft.com/office/drawing/2010/main" xmlns="" w="9525">
                   <a:solidFill>
                     <a:srgbClr val="000000"/>
                   </a:solidFill>
@@ -2468,7 +2322,7 @@
             </a:ln>
             <a:extLst>
               <a:ext uri="{91240B29-F687-4F45-9708-019B960494DF}">
-                <a14:hiddenLine xmlns:a14="http://schemas.microsoft.com/office/drawing/2010/main" w="9525">
+                <a14:hiddenLine xmlns:a14="http://schemas.microsoft.com/office/drawing/2010/main" xmlns="" w="9525">
                   <a:solidFill>
                     <a:srgbClr val="000000"/>
                   </a:solidFill>
@@ -2558,7 +2412,7 @@
             </a:ln>
             <a:extLst>
               <a:ext uri="{91240B29-F687-4F45-9708-019B960494DF}">
-                <a14:hiddenLine xmlns:a14="http://schemas.microsoft.com/office/drawing/2010/main" w="9525">
+                <a14:hiddenLine xmlns:a14="http://schemas.microsoft.com/office/drawing/2010/main" xmlns="" w="9525">
                   <a:solidFill>
                     <a:srgbClr val="000000"/>
                   </a:solidFill>
@@ -2648,7 +2502,7 @@
             </a:ln>
             <a:extLst>
               <a:ext uri="{91240B29-F687-4F45-9708-019B960494DF}">
-                <a14:hiddenLine xmlns:a14="http://schemas.microsoft.com/office/drawing/2010/main" w="9525">
+                <a14:hiddenLine xmlns:a14="http://schemas.microsoft.com/office/drawing/2010/main" xmlns="" w="9525">
                   <a:solidFill>
                     <a:srgbClr val="000000"/>
                   </a:solidFill>
@@ -2704,7 +2558,7 @@
             </a:ln>
             <a:extLst>
               <a:ext uri="{91240B29-F687-4F45-9708-019B960494DF}">
-                <a14:hiddenLine xmlns:a14="http://schemas.microsoft.com/office/drawing/2010/main" w="9525">
+                <a14:hiddenLine xmlns:a14="http://schemas.microsoft.com/office/drawing/2010/main" xmlns="" w="9525">
                   <a:solidFill>
                     <a:srgbClr val="000000"/>
                   </a:solidFill>
@@ -2794,7 +2648,7 @@
             </a:ln>
             <a:extLst>
               <a:ext uri="{91240B29-F687-4F45-9708-019B960494DF}">
-                <a14:hiddenLine xmlns:a14="http://schemas.microsoft.com/office/drawing/2010/main" w="9525">
+                <a14:hiddenLine xmlns:a14="http://schemas.microsoft.com/office/drawing/2010/main" xmlns="" w="9525">
                   <a:solidFill>
                     <a:srgbClr val="000000"/>
                   </a:solidFill>
@@ -2850,7 +2704,7 @@
             </a:ln>
             <a:extLst>
               <a:ext uri="{91240B29-F687-4F45-9708-019B960494DF}">
-                <a14:hiddenLine xmlns:a14="http://schemas.microsoft.com/office/drawing/2010/main" w="9525">
+                <a14:hiddenLine xmlns:a14="http://schemas.microsoft.com/office/drawing/2010/main" xmlns="" w="9525">
                   <a:solidFill>
                     <a:srgbClr val="000000"/>
                   </a:solidFill>
@@ -2940,7 +2794,7 @@
             </a:ln>
             <a:extLst>
               <a:ext uri="{91240B29-F687-4F45-9708-019B960494DF}">
-                <a14:hiddenLine xmlns:a14="http://schemas.microsoft.com/office/drawing/2010/main" w="9525">
+                <a14:hiddenLine xmlns:a14="http://schemas.microsoft.com/office/drawing/2010/main" xmlns="" w="9525">
                   <a:solidFill>
                     <a:srgbClr val="000000"/>
                   </a:solidFill>
@@ -3008,7 +2862,7 @@
             </a:ln>
             <a:extLst>
               <a:ext uri="{91240B29-F687-4F45-9708-019B960494DF}">
-                <a14:hiddenLine xmlns:a14="http://schemas.microsoft.com/office/drawing/2010/main" w="9525">
+                <a14:hiddenLine xmlns:a14="http://schemas.microsoft.com/office/drawing/2010/main" xmlns="" w="9525">
                   <a:solidFill>
                     <a:srgbClr val="000000"/>
                   </a:solidFill>
@@ -3098,7 +2952,7 @@
             </a:ln>
             <a:extLst>
               <a:ext uri="{91240B29-F687-4F45-9708-019B960494DF}">
-                <a14:hiddenLine xmlns:a14="http://schemas.microsoft.com/office/drawing/2010/main" w="9525">
+                <a14:hiddenLine xmlns:a14="http://schemas.microsoft.com/office/drawing/2010/main" xmlns="" w="9525">
                   <a:solidFill>
                     <a:srgbClr val="000000"/>
                   </a:solidFill>
@@ -3166,7 +3020,7 @@
             </a:ln>
             <a:extLst>
               <a:ext uri="{91240B29-F687-4F45-9708-019B960494DF}">
-                <a14:hiddenLine xmlns:a14="http://schemas.microsoft.com/office/drawing/2010/main" w="9525">
+                <a14:hiddenLine xmlns:a14="http://schemas.microsoft.com/office/drawing/2010/main" xmlns="" w="9525">
                   <a:solidFill>
                     <a:srgbClr val="000000"/>
                   </a:solidFill>
@@ -3256,7 +3110,7 @@
             </a:ln>
             <a:extLst>
               <a:ext uri="{91240B29-F687-4F45-9708-019B960494DF}">
-                <a14:hiddenLine xmlns:a14="http://schemas.microsoft.com/office/drawing/2010/main" w="9525">
+                <a14:hiddenLine xmlns:a14="http://schemas.microsoft.com/office/drawing/2010/main" xmlns="" w="9525">
                   <a:solidFill>
                     <a:srgbClr val="000000"/>
                   </a:solidFill>
@@ -3290,7 +3144,7 @@
             </a:ln>
             <a:extLst>
               <a:ext uri="{91240B29-F687-4F45-9708-019B960494DF}">
-                <a14:hiddenLine xmlns:a14="http://schemas.microsoft.com/office/drawing/2010/main" w="9525">
+                <a14:hiddenLine xmlns:a14="http://schemas.microsoft.com/office/drawing/2010/main" xmlns="" w="9525">
                   <a:solidFill>
                     <a:srgbClr val="000000"/>
                   </a:solidFill>
@@ -3380,7 +3234,7 @@
             </a:ln>
             <a:extLst>
               <a:ext uri="{91240B29-F687-4F45-9708-019B960494DF}">
-                <a14:hiddenLine xmlns:a14="http://schemas.microsoft.com/office/drawing/2010/main" w="9525">
+                <a14:hiddenLine xmlns:a14="http://schemas.microsoft.com/office/drawing/2010/main" xmlns="" w="9525">
                   <a:solidFill>
                     <a:srgbClr val="000000"/>
                   </a:solidFill>
@@ -3442,7 +3296,7 @@
             </a:ln>
             <a:extLst>
               <a:ext uri="{91240B29-F687-4F45-9708-019B960494DF}">
-                <a14:hiddenLine xmlns:a14="http://schemas.microsoft.com/office/drawing/2010/main" w="9525">
+                <a14:hiddenLine xmlns:a14="http://schemas.microsoft.com/office/drawing/2010/main" xmlns="" w="9525">
                   <a:solidFill>
                     <a:srgbClr val="000000"/>
                   </a:solidFill>
@@ -3504,7 +3358,7 @@
             </a:ln>
             <a:extLst>
               <a:ext uri="{91240B29-F687-4F45-9708-019B960494DF}">
-                <a14:hiddenLine xmlns:a14="http://schemas.microsoft.com/office/drawing/2010/main" w="9525">
+                <a14:hiddenLine xmlns:a14="http://schemas.microsoft.com/office/drawing/2010/main" xmlns="" w="9525">
                   <a:solidFill>
                     <a:srgbClr val="000000"/>
                   </a:solidFill>
@@ -3594,7 +3448,7 @@
             </a:ln>
             <a:extLst>
               <a:ext uri="{91240B29-F687-4F45-9708-019B960494DF}">
-                <a14:hiddenLine xmlns:a14="http://schemas.microsoft.com/office/drawing/2010/main" w="9525">
+                <a14:hiddenLine xmlns:a14="http://schemas.microsoft.com/office/drawing/2010/main" xmlns="" w="9525">
                   <a:solidFill>
                     <a:srgbClr val="000000"/>
                   </a:solidFill>
@@ -3662,7 +3516,7 @@
             </a:ln>
             <a:extLst>
               <a:ext uri="{91240B29-F687-4F45-9708-019B960494DF}">
-                <a14:hiddenLine xmlns:a14="http://schemas.microsoft.com/office/drawing/2010/main" w="9525">
+                <a14:hiddenLine xmlns:a14="http://schemas.microsoft.com/office/drawing/2010/main" xmlns="" w="9525">
                   <a:solidFill>
                     <a:srgbClr val="000000"/>
                   </a:solidFill>
@@ -3724,7 +3578,7 @@
             </a:ln>
             <a:extLst>
               <a:ext uri="{91240B29-F687-4F45-9708-019B960494DF}">
-                <a14:hiddenLine xmlns:a14="http://schemas.microsoft.com/office/drawing/2010/main" w="9525">
+                <a14:hiddenLine xmlns:a14="http://schemas.microsoft.com/office/drawing/2010/main" xmlns="" w="9525">
                   <a:solidFill>
                     <a:srgbClr val="000000"/>
                   </a:solidFill>
@@ -3814,7 +3668,7 @@
             </a:ln>
             <a:extLst>
               <a:ext uri="{91240B29-F687-4F45-9708-019B960494DF}">
-                <a14:hiddenLine xmlns:a14="http://schemas.microsoft.com/office/drawing/2010/main" w="9525">
+                <a14:hiddenLine xmlns:a14="http://schemas.microsoft.com/office/drawing/2010/main" xmlns="" w="9525">
                   <a:solidFill>
                     <a:srgbClr val="000000"/>
                   </a:solidFill>
@@ -3876,7 +3730,7 @@
             </a:ln>
             <a:extLst>
               <a:ext uri="{91240B29-F687-4F45-9708-019B960494DF}">
-                <a14:hiddenLine xmlns:a14="http://schemas.microsoft.com/office/drawing/2010/main" w="9525">
+                <a14:hiddenLine xmlns:a14="http://schemas.microsoft.com/office/drawing/2010/main" xmlns="" w="9525">
                   <a:solidFill>
                     <a:srgbClr val="000000"/>
                   </a:solidFill>
@@ -3966,7 +3820,7 @@
             </a:ln>
             <a:extLst>
               <a:ext uri="{91240B29-F687-4F45-9708-019B960494DF}">
-                <a14:hiddenLine xmlns:a14="http://schemas.microsoft.com/office/drawing/2010/main" w="9525">
+                <a14:hiddenLine xmlns:a14="http://schemas.microsoft.com/office/drawing/2010/main" xmlns="" w="9525">
                   <a:solidFill>
                     <a:srgbClr val="000000"/>
                   </a:solidFill>
@@ -4028,7 +3882,7 @@
             </a:ln>
             <a:extLst>
               <a:ext uri="{91240B29-F687-4F45-9708-019B960494DF}">
-                <a14:hiddenLine xmlns:a14="http://schemas.microsoft.com/office/drawing/2010/main" w="9525">
+                <a14:hiddenLine xmlns:a14="http://schemas.microsoft.com/office/drawing/2010/main" xmlns="" w="9525">
                   <a:solidFill>
                     <a:srgbClr val="000000"/>
                   </a:solidFill>
@@ -4118,7 +3972,7 @@
             </a:ln>
             <a:extLst>
               <a:ext uri="{91240B29-F687-4F45-9708-019B960494DF}">
-                <a14:hiddenLine xmlns:a14="http://schemas.microsoft.com/office/drawing/2010/main" w="9525">
+                <a14:hiddenLine xmlns:a14="http://schemas.microsoft.com/office/drawing/2010/main" xmlns="" w="9525">
                   <a:solidFill>
                     <a:srgbClr val="000000"/>
                   </a:solidFill>
@@ -4152,7 +4006,7 @@
             </a:ln>
             <a:extLst>
               <a:ext uri="{91240B29-F687-4F45-9708-019B960494DF}">
-                <a14:hiddenLine xmlns:a14="http://schemas.microsoft.com/office/drawing/2010/main" w="9525">
+                <a14:hiddenLine xmlns:a14="http://schemas.microsoft.com/office/drawing/2010/main" xmlns="" w="9525">
                   <a:solidFill>
                     <a:srgbClr val="000000"/>
                   </a:solidFill>
@@ -4217,7 +4071,7 @@
             </a:ln>
             <a:extLst>
               <a:ext uri="{91240B29-F687-4F45-9708-019B960494DF}">
-                <a14:hiddenLine xmlns:a14="http://schemas.microsoft.com/office/drawing/2010/main" w="9525">
+                <a14:hiddenLine xmlns:a14="http://schemas.microsoft.com/office/drawing/2010/main" xmlns="" w="9525">
                   <a:solidFill>
                     <a:srgbClr val="000000"/>
                   </a:solidFill>
@@ -4307,7 +4161,7 @@
             </a:ln>
             <a:extLst>
               <a:ext uri="{91240B29-F687-4F45-9708-019B960494DF}">
-                <a14:hiddenLine xmlns:a14="http://schemas.microsoft.com/office/drawing/2010/main" w="9525">
+                <a14:hiddenLine xmlns:a14="http://schemas.microsoft.com/office/drawing/2010/main" xmlns="" w="9525">
                   <a:solidFill>
                     <a:srgbClr val="000000"/>
                   </a:solidFill>
@@ -4369,7 +4223,7 @@
             </a:ln>
             <a:extLst>
               <a:ext uri="{91240B29-F687-4F45-9708-019B960494DF}">
-                <a14:hiddenLine xmlns:a14="http://schemas.microsoft.com/office/drawing/2010/main" w="9525">
+                <a14:hiddenLine xmlns:a14="http://schemas.microsoft.com/office/drawing/2010/main" xmlns="" w="9525">
                   <a:solidFill>
                     <a:srgbClr val="000000"/>
                   </a:solidFill>
@@ -4459,7 +4313,7 @@
             </a:ln>
             <a:extLst>
               <a:ext uri="{91240B29-F687-4F45-9708-019B960494DF}">
-                <a14:hiddenLine xmlns:a14="http://schemas.microsoft.com/office/drawing/2010/main" w="9525">
+                <a14:hiddenLine xmlns:a14="http://schemas.microsoft.com/office/drawing/2010/main" xmlns="" w="9525">
                   <a:solidFill>
                     <a:srgbClr val="000000"/>
                   </a:solidFill>
@@ -4549,7 +4403,7 @@
             </a:ln>
             <a:extLst>
               <a:ext uri="{91240B29-F687-4F45-9708-019B960494DF}">
-                <a14:hiddenLine xmlns:a14="http://schemas.microsoft.com/office/drawing/2010/main" w="9525">
+                <a14:hiddenLine xmlns:a14="http://schemas.microsoft.com/office/drawing/2010/main" xmlns="" w="9525">
                   <a:solidFill>
                     <a:srgbClr val="000000"/>
                   </a:solidFill>
@@ -4614,7 +4468,7 @@
             </a:ln>
             <a:extLst>
               <a:ext uri="{91240B29-F687-4F45-9708-019B960494DF}">
-                <a14:hiddenLine xmlns:a14="http://schemas.microsoft.com/office/drawing/2010/main" w="9525">
+                <a14:hiddenLine xmlns:a14="http://schemas.microsoft.com/office/drawing/2010/main" xmlns="" w="9525">
                   <a:solidFill>
                     <a:srgbClr val="000000"/>
                   </a:solidFill>
@@ -4676,7 +4530,7 @@
             </a:ln>
             <a:extLst>
               <a:ext uri="{91240B29-F687-4F45-9708-019B960494DF}">
-                <a14:hiddenLine xmlns:a14="http://schemas.microsoft.com/office/drawing/2010/main" w="9525">
+                <a14:hiddenLine xmlns:a14="http://schemas.microsoft.com/office/drawing/2010/main" xmlns="" w="9525">
                   <a:solidFill>
                     <a:srgbClr val="000000"/>
                   </a:solidFill>
@@ -4766,7 +4620,7 @@
             </a:ln>
             <a:extLst>
               <a:ext uri="{91240B29-F687-4F45-9708-019B960494DF}">
-                <a14:hiddenLine xmlns:a14="http://schemas.microsoft.com/office/drawing/2010/main" w="9525">
+                <a14:hiddenLine xmlns:a14="http://schemas.microsoft.com/office/drawing/2010/main" xmlns="" w="9525">
                   <a:solidFill>
                     <a:srgbClr val="000000"/>
                   </a:solidFill>
@@ -4856,7 +4710,7 @@
             </a:ln>
             <a:extLst>
               <a:ext uri="{91240B29-F687-4F45-9708-019B960494DF}">
-                <a14:hiddenLine xmlns:a14="http://schemas.microsoft.com/office/drawing/2010/main" w="9525">
+                <a14:hiddenLine xmlns:a14="http://schemas.microsoft.com/office/drawing/2010/main" xmlns="" w="9525">
                   <a:solidFill>
                     <a:srgbClr val="000000"/>
                   </a:solidFill>
@@ -4918,7 +4772,7 @@
             </a:ln>
             <a:extLst>
               <a:ext uri="{91240B29-F687-4F45-9708-019B960494DF}">
-                <a14:hiddenLine xmlns:a14="http://schemas.microsoft.com/office/drawing/2010/main" w="9525">
+                <a14:hiddenLine xmlns:a14="http://schemas.microsoft.com/office/drawing/2010/main" xmlns="" w="9525">
                   <a:solidFill>
                     <a:srgbClr val="000000"/>
                   </a:solidFill>
@@ -5038,7 +4892,7 @@
             </a:ln>
             <a:extLst>
               <a:ext uri="{91240B29-F687-4F45-9708-019B960494DF}">
-                <a14:hiddenLine xmlns:a14="http://schemas.microsoft.com/office/drawing/2010/main" w="9525">
+                <a14:hiddenLine xmlns:a14="http://schemas.microsoft.com/office/drawing/2010/main" xmlns="" w="9525">
                   <a:solidFill>
                     <a:srgbClr val="000000"/>
                   </a:solidFill>
@@ -5106,7 +4960,7 @@
             </a:ln>
             <a:extLst>
               <a:ext uri="{91240B29-F687-4F45-9708-019B960494DF}">
-                <a14:hiddenLine xmlns:a14="http://schemas.microsoft.com/office/drawing/2010/main" w="9525">
+                <a14:hiddenLine xmlns:a14="http://schemas.microsoft.com/office/drawing/2010/main" xmlns="" w="9525">
                   <a:solidFill>
                     <a:srgbClr val="000000"/>
                   </a:solidFill>
@@ -5196,7 +5050,7 @@
             </a:ln>
             <a:extLst>
               <a:ext uri="{91240B29-F687-4F45-9708-019B960494DF}">
-                <a14:hiddenLine xmlns:a14="http://schemas.microsoft.com/office/drawing/2010/main" w="9525">
+                <a14:hiddenLine xmlns:a14="http://schemas.microsoft.com/office/drawing/2010/main" xmlns="" w="9525">
                   <a:solidFill>
                     <a:srgbClr val="000000"/>
                   </a:solidFill>
@@ -5336,7 +5190,8 @@
           <a:p>
             <a:fld id="{48A87A34-81AB-432B-8DAE-1953F412C126}" type="datetimeFigureOut">
               <a:rPr lang="en-US" dirty="0"/>
-              <a:t>6/13/2017</a:t>
+              <a:pPr/>
+              <a:t>6/14/2017</a:t>
             </a:fld>
             <a:endParaRPr lang="en-US" dirty="0"/>
           </a:p>
@@ -5388,6 +5243,7 @@
           <a:p>
             <a:fld id="{6D22F896-40B5-4ADD-8801-0D06FADFA095}" type="slidenum">
               <a:rPr lang="en-US" dirty="0"/>
+              <a:pPr/>
               <a:t>‹#›</a:t>
             </a:fld>
             <a:endParaRPr lang="en-US" dirty="0"/>
@@ -5598,7 +5454,8 @@
           <a:p>
             <a:fld id="{48A87A34-81AB-432B-8DAE-1953F412C126}" type="datetimeFigureOut">
               <a:rPr lang="en-US" dirty="0"/>
-              <a:t>6/13/2017</a:t>
+              <a:pPr/>
+              <a:t>6/14/2017</a:t>
             </a:fld>
             <a:endParaRPr lang="en-US" dirty="0"/>
           </a:p>
@@ -5640,6 +5497,7 @@
           <a:p>
             <a:fld id="{6D22F896-40B5-4ADD-8801-0D06FADFA095}" type="slidenum">
               <a:rPr lang="en-US" dirty="0"/>
+              <a:pPr/>
               <a:t>‹#›</a:t>
             </a:fld>
             <a:endParaRPr lang="en-US" dirty="0"/>
@@ -5789,7 +5647,8 @@
           <a:p>
             <a:fld id="{48A87A34-81AB-432B-8DAE-1953F412C126}" type="datetimeFigureOut">
               <a:rPr lang="en-US" dirty="0"/>
-              <a:t>6/13/2017</a:t>
+              <a:pPr/>
+              <a:t>6/14/2017</a:t>
             </a:fld>
             <a:endParaRPr lang="en-US" dirty="0"/>
           </a:p>
@@ -5831,6 +5690,7 @@
           <a:p>
             <a:fld id="{6D22F896-40B5-4ADD-8801-0D06FADFA095}" type="slidenum">
               <a:rPr lang="en-US" dirty="0"/>
+              <a:pPr/>
               <a:t>‹#›</a:t>
             </a:fld>
             <a:endParaRPr lang="en-US" dirty="0"/>
@@ -6047,7 +5907,8 @@
           <a:p>
             <a:fld id="{48A87A34-81AB-432B-8DAE-1953F412C126}" type="datetimeFigureOut">
               <a:rPr lang="en-US" dirty="0"/>
-              <a:t>6/13/2017</a:t>
+              <a:pPr/>
+              <a:t>6/14/2017</a:t>
             </a:fld>
             <a:endParaRPr lang="en-US" dirty="0"/>
           </a:p>
@@ -6089,6 +5950,7 @@
           <a:p>
             <a:fld id="{6D22F896-40B5-4ADD-8801-0D06FADFA095}" type="slidenum">
               <a:rPr lang="en-US" dirty="0"/>
+              <a:pPr/>
               <a:t>‹#›</a:t>
             </a:fld>
             <a:endParaRPr lang="en-US" dirty="0"/>
@@ -6476,7 +6338,8 @@
           <a:p>
             <a:fld id="{48A87A34-81AB-432B-8DAE-1953F412C126}" type="datetimeFigureOut">
               <a:rPr lang="en-US" dirty="0"/>
-              <a:t>6/13/2017</a:t>
+              <a:pPr/>
+              <a:t>6/14/2017</a:t>
             </a:fld>
             <a:endParaRPr lang="en-US" dirty="0"/>
           </a:p>
@@ -6518,6 +6381,7 @@
           <a:p>
             <a:fld id="{6D22F896-40B5-4ADD-8801-0D06FADFA095}" type="slidenum">
               <a:rPr lang="en-US" dirty="0"/>
+              <a:pPr/>
               <a:t>‹#›</a:t>
             </a:fld>
             <a:endParaRPr lang="en-US" dirty="0"/>
@@ -7017,7 +6881,8 @@
           <a:p>
             <a:fld id="{48A87A34-81AB-432B-8DAE-1953F412C126}" type="datetimeFigureOut">
               <a:rPr lang="en-US" dirty="0"/>
-              <a:t>6/13/2017</a:t>
+              <a:pPr/>
+              <a:t>6/14/2017</a:t>
             </a:fld>
             <a:endParaRPr lang="en-US" dirty="0"/>
           </a:p>
@@ -7059,6 +6924,7 @@
           <a:p>
             <a:fld id="{6D22F896-40B5-4ADD-8801-0D06FADFA095}" type="slidenum">
               <a:rPr lang="en-US" dirty="0"/>
+              <a:pPr/>
               <a:t>‹#›</a:t>
             </a:fld>
             <a:endParaRPr lang="en-US" dirty="0"/>
@@ -7732,7 +7598,8 @@
           <a:p>
             <a:fld id="{48A87A34-81AB-432B-8DAE-1953F412C126}" type="datetimeFigureOut">
               <a:rPr lang="en-US" dirty="0"/>
-              <a:t>6/13/2017</a:t>
+              <a:pPr/>
+              <a:t>6/14/2017</a:t>
             </a:fld>
             <a:endParaRPr lang="en-US" dirty="0"/>
           </a:p>
@@ -7774,6 +7641,7 @@
           <a:p>
             <a:fld id="{6D22F896-40B5-4ADD-8801-0D06FADFA095}" type="slidenum">
               <a:rPr lang="en-US" dirty="0"/>
+              <a:pPr/>
               <a:t>‹#›</a:t>
             </a:fld>
             <a:endParaRPr lang="en-US" dirty="0"/>
@@ -7897,7 +7765,8 @@
           <a:p>
             <a:fld id="{48A87A34-81AB-432B-8DAE-1953F412C126}" type="datetimeFigureOut">
               <a:rPr lang="en-US" dirty="0"/>
-              <a:t>6/13/2017</a:t>
+              <a:pPr/>
+              <a:t>6/14/2017</a:t>
             </a:fld>
             <a:endParaRPr lang="en-US" dirty="0"/>
           </a:p>
@@ -7939,6 +7808,7 @@
           <a:p>
             <a:fld id="{6D22F896-40B5-4ADD-8801-0D06FADFA095}" type="slidenum">
               <a:rPr lang="en-US" dirty="0"/>
+              <a:pPr/>
               <a:t>‹#›</a:t>
             </a:fld>
             <a:endParaRPr lang="en-US" dirty="0"/>
@@ -8072,7 +7942,8 @@
           <a:p>
             <a:fld id="{48A87A34-81AB-432B-8DAE-1953F412C126}" type="datetimeFigureOut">
               <a:rPr lang="en-US" dirty="0"/>
-              <a:t>6/13/2017</a:t>
+              <a:pPr/>
+              <a:t>6/14/2017</a:t>
             </a:fld>
             <a:endParaRPr lang="en-US" dirty="0"/>
           </a:p>
@@ -8114,6 +7985,7 @@
           <a:p>
             <a:fld id="{6D22F896-40B5-4ADD-8801-0D06FADFA095}" type="slidenum">
               <a:rPr lang="en-US" dirty="0"/>
+              <a:pPr/>
               <a:t>‹#›</a:t>
             </a:fld>
             <a:endParaRPr lang="en-US" dirty="0"/>
@@ -8237,7 +8109,8 @@
           <a:p>
             <a:fld id="{48A87A34-81AB-432B-8DAE-1953F412C126}" type="datetimeFigureOut">
               <a:rPr lang="en-US" dirty="0"/>
-              <a:t>6/13/2017</a:t>
+              <a:pPr/>
+              <a:t>6/14/2017</a:t>
             </a:fld>
             <a:endParaRPr lang="en-US" dirty="0"/>
           </a:p>
@@ -8279,6 +8152,7 @@
           <a:p>
             <a:fld id="{6D22F896-40B5-4ADD-8801-0D06FADFA095}" type="slidenum">
               <a:rPr lang="en-US" dirty="0"/>
+              <a:pPr/>
               <a:t>‹#›</a:t>
             </a:fld>
             <a:endParaRPr lang="en-US" dirty="0"/>
@@ -8482,7 +8356,8 @@
           <a:p>
             <a:fld id="{48A87A34-81AB-432B-8DAE-1953F412C126}" type="datetimeFigureOut">
               <a:rPr lang="en-US" dirty="0"/>
-              <a:t>6/13/2017</a:t>
+              <a:pPr/>
+              <a:t>6/14/2017</a:t>
             </a:fld>
             <a:endParaRPr lang="en-US" dirty="0"/>
           </a:p>
@@ -8524,6 +8399,7 @@
           <a:p>
             <a:fld id="{6D22F896-40B5-4ADD-8801-0D06FADFA095}" type="slidenum">
               <a:rPr lang="en-US" dirty="0"/>
+              <a:pPr/>
               <a:t>‹#›</a:t>
             </a:fld>
             <a:endParaRPr lang="en-US" dirty="0"/>
@@ -8709,7 +8585,8 @@
           <a:p>
             <a:fld id="{48A87A34-81AB-432B-8DAE-1953F412C126}" type="datetimeFigureOut">
               <a:rPr lang="en-US" dirty="0"/>
-              <a:t>6/13/2017</a:t>
+              <a:pPr/>
+              <a:t>6/14/2017</a:t>
             </a:fld>
             <a:endParaRPr lang="en-US" dirty="0"/>
           </a:p>
@@ -8751,6 +8628,7 @@
           <a:p>
             <a:fld id="{6D22F896-40B5-4ADD-8801-0D06FADFA095}" type="slidenum">
               <a:rPr lang="en-US" dirty="0"/>
+              <a:pPr/>
               <a:t>‹#›</a:t>
             </a:fld>
             <a:endParaRPr lang="en-US" dirty="0"/>
@@ -9085,7 +8963,8 @@
           <a:p>
             <a:fld id="{48A87A34-81AB-432B-8DAE-1953F412C126}" type="datetimeFigureOut">
               <a:rPr lang="en-US" dirty="0"/>
-              <a:t>6/13/2017</a:t>
+              <a:pPr/>
+              <a:t>6/14/2017</a:t>
             </a:fld>
             <a:endParaRPr lang="en-US" dirty="0"/>
           </a:p>
@@ -9127,6 +9006,7 @@
           <a:p>
             <a:fld id="{6D22F896-40B5-4ADD-8801-0D06FADFA095}" type="slidenum">
               <a:rPr lang="en-US" dirty="0"/>
+              <a:pPr/>
               <a:t>‹#›</a:t>
             </a:fld>
             <a:endParaRPr lang="en-US" dirty="0"/>
@@ -9198,7 +9078,8 @@
           <a:p>
             <a:fld id="{48A87A34-81AB-432B-8DAE-1953F412C126}" type="datetimeFigureOut">
               <a:rPr lang="en-US" dirty="0"/>
-              <a:t>6/13/2017</a:t>
+              <a:pPr/>
+              <a:t>6/14/2017</a:t>
             </a:fld>
             <a:endParaRPr lang="en-US" dirty="0"/>
           </a:p>
@@ -9240,6 +9121,7 @@
           <a:p>
             <a:fld id="{6D22F896-40B5-4ADD-8801-0D06FADFA095}" type="slidenum">
               <a:rPr lang="en-US" dirty="0"/>
+              <a:pPr/>
               <a:t>‹#›</a:t>
             </a:fld>
             <a:endParaRPr lang="en-US" dirty="0"/>
@@ -9288,7 +9170,8 @@
           <a:p>
             <a:fld id="{48A87A34-81AB-432B-8DAE-1953F412C126}" type="datetimeFigureOut">
               <a:rPr lang="en-US" dirty="0"/>
-              <a:t>6/13/2017</a:t>
+              <a:pPr/>
+              <a:t>6/14/2017</a:t>
             </a:fld>
             <a:endParaRPr lang="en-US" dirty="0"/>
           </a:p>
@@ -9330,6 +9213,7 @@
           <a:p>
             <a:fld id="{6D22F896-40B5-4ADD-8801-0D06FADFA095}" type="slidenum">
               <a:rPr lang="en-US" dirty="0"/>
+              <a:pPr/>
               <a:t>‹#›</a:t>
             </a:fld>
             <a:endParaRPr lang="en-US" dirty="0"/>
@@ -9532,7 +9416,8 @@
           <a:p>
             <a:fld id="{48A87A34-81AB-432B-8DAE-1953F412C126}" type="datetimeFigureOut">
               <a:rPr lang="en-US" dirty="0"/>
-              <a:t>6/13/2017</a:t>
+              <a:pPr/>
+              <a:t>6/14/2017</a:t>
             </a:fld>
             <a:endParaRPr lang="en-US" dirty="0"/>
           </a:p>
@@ -9574,6 +9459,7 @@
           <a:p>
             <a:fld id="{6D22F896-40B5-4ADD-8801-0D06FADFA095}" type="slidenum">
               <a:rPr lang="en-US" dirty="0"/>
+              <a:pPr/>
               <a:t>‹#›</a:t>
             </a:fld>
             <a:endParaRPr lang="en-US" dirty="0"/>
@@ -9807,7 +9693,8 @@
           <a:p>
             <a:fld id="{48A87A34-81AB-432B-8DAE-1953F412C126}" type="datetimeFigureOut">
               <a:rPr lang="en-US" dirty="0"/>
-              <a:t>6/13/2017</a:t>
+              <a:pPr/>
+              <a:t>6/14/2017</a:t>
             </a:fld>
             <a:endParaRPr lang="en-US" dirty="0"/>
           </a:p>
@@ -9849,6 +9736,7 @@
           <a:p>
             <a:fld id="{6D22F896-40B5-4ADD-8801-0D06FADFA095}" type="slidenum">
               <a:rPr lang="en-US" dirty="0"/>
+              <a:pPr/>
               <a:t>‹#›</a:t>
             </a:fld>
             <a:endParaRPr lang="en-US" dirty="0"/>
@@ -9898,7 +9786,7 @@
             <a:alphaModFix amt="30000"/>
             <a:extLst>
               <a:ext uri="{28A0092B-C50C-407E-A947-70E740481C1C}">
-                <a14:useLocalDpi xmlns:a14="http://schemas.microsoft.com/office/drawing/2010/main" val="0"/>
+                <a14:useLocalDpi xmlns:a14="http://schemas.microsoft.com/office/drawing/2010/main" xmlns="" val="0"/>
               </a:ext>
             </a:extLst>
           </a:blip>
@@ -9918,7 +9806,7 @@
           <a:noFill/>
           <a:extLst>
             <a:ext uri="{909E8E84-426E-40DD-AFC4-6F175D3DCCD1}">
-              <a14:hiddenFill xmlns:a14="http://schemas.microsoft.com/office/drawing/2010/main">
+              <a14:hiddenFill xmlns:a14="http://schemas.microsoft.com/office/drawing/2010/main" xmlns="">
                 <a:solidFill>
                   <a:srgbClr val="FFFFFF"/>
                 </a:solidFill>
@@ -9992,7 +9880,7 @@
               </a:ln>
               <a:extLst>
                 <a:ext uri="{91240B29-F687-4F45-9708-019B960494DF}">
-                  <a14:hiddenLine xmlns:a14="http://schemas.microsoft.com/office/drawing/2010/main" w="9525">
+                  <a14:hiddenLine xmlns:a14="http://schemas.microsoft.com/office/drawing/2010/main" xmlns="" w="9525">
                     <a:solidFill>
                       <a:srgbClr val="000000"/>
                     </a:solidFill>
@@ -10082,7 +9970,7 @@
               </a:ln>
               <a:extLst>
                 <a:ext uri="{91240B29-F687-4F45-9708-019B960494DF}">
-                  <a14:hiddenLine xmlns:a14="http://schemas.microsoft.com/office/drawing/2010/main" w="9525">
+                  <a14:hiddenLine xmlns:a14="http://schemas.microsoft.com/office/drawing/2010/main" xmlns="" w="9525">
                     <a:solidFill>
                       <a:srgbClr val="000000"/>
                     </a:solidFill>
@@ -10172,7 +10060,7 @@
               </a:ln>
               <a:extLst>
                 <a:ext uri="{91240B29-F687-4F45-9708-019B960494DF}">
-                  <a14:hiddenLine xmlns:a14="http://schemas.microsoft.com/office/drawing/2010/main" w="9525">
+                  <a14:hiddenLine xmlns:a14="http://schemas.microsoft.com/office/drawing/2010/main" xmlns="" w="9525">
                     <a:solidFill>
                       <a:srgbClr val="000000"/>
                     </a:solidFill>
@@ -10234,7 +10122,7 @@
               </a:ln>
               <a:extLst>
                 <a:ext uri="{91240B29-F687-4F45-9708-019B960494DF}">
-                  <a14:hiddenLine xmlns:a14="http://schemas.microsoft.com/office/drawing/2010/main" w="9525">
+                  <a14:hiddenLine xmlns:a14="http://schemas.microsoft.com/office/drawing/2010/main" xmlns="" w="9525">
                     <a:solidFill>
                       <a:srgbClr val="000000"/>
                     </a:solidFill>
@@ -10324,7 +10212,7 @@
               </a:ln>
               <a:extLst>
                 <a:ext uri="{91240B29-F687-4F45-9708-019B960494DF}">
-                  <a14:hiddenLine xmlns:a14="http://schemas.microsoft.com/office/drawing/2010/main" w="9525">
+                  <a14:hiddenLine xmlns:a14="http://schemas.microsoft.com/office/drawing/2010/main" xmlns="" w="9525">
                     <a:solidFill>
                       <a:srgbClr val="000000"/>
                     </a:solidFill>
@@ -10386,7 +10274,7 @@
               </a:ln>
               <a:extLst>
                 <a:ext uri="{91240B29-F687-4F45-9708-019B960494DF}">
-                  <a14:hiddenLine xmlns:a14="http://schemas.microsoft.com/office/drawing/2010/main" w="9525">
+                  <a14:hiddenLine xmlns:a14="http://schemas.microsoft.com/office/drawing/2010/main" xmlns="" w="9525">
                     <a:solidFill>
                       <a:srgbClr val="000000"/>
                     </a:solidFill>
@@ -10448,7 +10336,7 @@
               </a:ln>
               <a:extLst>
                 <a:ext uri="{91240B29-F687-4F45-9708-019B960494DF}">
-                  <a14:hiddenLine xmlns:a14="http://schemas.microsoft.com/office/drawing/2010/main" w="9525">
+                  <a14:hiddenLine xmlns:a14="http://schemas.microsoft.com/office/drawing/2010/main" xmlns="" w="9525">
                     <a:solidFill>
                       <a:srgbClr val="000000"/>
                     </a:solidFill>
@@ -10538,7 +10426,7 @@
               </a:ln>
               <a:extLst>
                 <a:ext uri="{91240B29-F687-4F45-9708-019B960494DF}">
-                  <a14:hiddenLine xmlns:a14="http://schemas.microsoft.com/office/drawing/2010/main" w="9525">
+                  <a14:hiddenLine xmlns:a14="http://schemas.microsoft.com/office/drawing/2010/main" xmlns="" w="9525">
                     <a:solidFill>
                       <a:srgbClr val="000000"/>
                     </a:solidFill>
@@ -10628,7 +10516,7 @@
               </a:ln>
               <a:extLst>
                 <a:ext uri="{91240B29-F687-4F45-9708-019B960494DF}">
-                  <a14:hiddenLine xmlns:a14="http://schemas.microsoft.com/office/drawing/2010/main" w="9525">
+                  <a14:hiddenLine xmlns:a14="http://schemas.microsoft.com/office/drawing/2010/main" xmlns="" w="9525">
                     <a:solidFill>
                       <a:srgbClr val="000000"/>
                     </a:solidFill>
@@ -10690,7 +10578,7 @@
               </a:ln>
               <a:extLst>
                 <a:ext uri="{91240B29-F687-4F45-9708-019B960494DF}">
-                  <a14:hiddenLine xmlns:a14="http://schemas.microsoft.com/office/drawing/2010/main" w="9525">
+                  <a14:hiddenLine xmlns:a14="http://schemas.microsoft.com/office/drawing/2010/main" xmlns="" w="9525">
                     <a:solidFill>
                       <a:srgbClr val="000000"/>
                     </a:solidFill>
@@ -10800,7 +10688,7 @@
               </a:ln>
               <a:extLst>
                 <a:ext uri="{91240B29-F687-4F45-9708-019B960494DF}">
-                  <a14:hiddenLine xmlns:a14="http://schemas.microsoft.com/office/drawing/2010/main" w="9525">
+                  <a14:hiddenLine xmlns:a14="http://schemas.microsoft.com/office/drawing/2010/main" xmlns="" w="9525">
                     <a:solidFill>
                       <a:srgbClr val="000000"/>
                     </a:solidFill>
@@ -10884,7 +10772,7 @@
               </a:ln>
               <a:extLst>
                 <a:ext uri="{91240B29-F687-4F45-9708-019B960494DF}">
-                  <a14:hiddenLine xmlns:a14="http://schemas.microsoft.com/office/drawing/2010/main" w="9525">
+                  <a14:hiddenLine xmlns:a14="http://schemas.microsoft.com/office/drawing/2010/main" xmlns="" w="9525">
                     <a:solidFill>
                       <a:srgbClr val="000000"/>
                     </a:solidFill>
@@ -10946,7 +10834,7 @@
               </a:ln>
               <a:extLst>
                 <a:ext uri="{91240B29-F687-4F45-9708-019B960494DF}">
-                  <a14:hiddenLine xmlns:a14="http://schemas.microsoft.com/office/drawing/2010/main" w="9525">
+                  <a14:hiddenLine xmlns:a14="http://schemas.microsoft.com/office/drawing/2010/main" xmlns="" w="9525">
                     <a:solidFill>
                       <a:srgbClr val="000000"/>
                     </a:solidFill>
@@ -11008,7 +10896,7 @@
               </a:ln>
               <a:extLst>
                 <a:ext uri="{91240B29-F687-4F45-9708-019B960494DF}">
-                  <a14:hiddenLine xmlns:a14="http://schemas.microsoft.com/office/drawing/2010/main" w="9525">
+                  <a14:hiddenLine xmlns:a14="http://schemas.microsoft.com/office/drawing/2010/main" xmlns="" w="9525">
                     <a:solidFill>
                       <a:srgbClr val="000000"/>
                     </a:solidFill>
@@ -11098,7 +10986,7 @@
               </a:ln>
               <a:extLst>
                 <a:ext uri="{91240B29-F687-4F45-9708-019B960494DF}">
-                  <a14:hiddenLine xmlns:a14="http://schemas.microsoft.com/office/drawing/2010/main" w="9525">
+                  <a14:hiddenLine xmlns:a14="http://schemas.microsoft.com/office/drawing/2010/main" xmlns="" w="9525">
                     <a:solidFill>
                       <a:srgbClr val="000000"/>
                     </a:solidFill>
@@ -11132,7 +11020,7 @@
               </a:ln>
               <a:extLst>
                 <a:ext uri="{91240B29-F687-4F45-9708-019B960494DF}">
-                  <a14:hiddenLine xmlns:a14="http://schemas.microsoft.com/office/drawing/2010/main" w="9525">
+                  <a14:hiddenLine xmlns:a14="http://schemas.microsoft.com/office/drawing/2010/main" xmlns="" w="9525">
                     <a:solidFill>
                       <a:srgbClr val="000000"/>
                     </a:solidFill>
@@ -11197,7 +11085,7 @@
               </a:ln>
               <a:extLst>
                 <a:ext uri="{91240B29-F687-4F45-9708-019B960494DF}">
-                  <a14:hiddenLine xmlns:a14="http://schemas.microsoft.com/office/drawing/2010/main" w="9525">
+                  <a14:hiddenLine xmlns:a14="http://schemas.microsoft.com/office/drawing/2010/main" xmlns="" w="9525">
                     <a:solidFill>
                       <a:srgbClr val="000000"/>
                     </a:solidFill>
@@ -11287,7 +11175,7 @@
               </a:ln>
               <a:extLst>
                 <a:ext uri="{91240B29-F687-4F45-9708-019B960494DF}">
-                  <a14:hiddenLine xmlns:a14="http://schemas.microsoft.com/office/drawing/2010/main" w="9525">
+                  <a14:hiddenLine xmlns:a14="http://schemas.microsoft.com/office/drawing/2010/main" xmlns="" w="9525">
                     <a:solidFill>
                       <a:srgbClr val="000000"/>
                     </a:solidFill>
@@ -11349,7 +11237,7 @@
               </a:ln>
               <a:extLst>
                 <a:ext uri="{91240B29-F687-4F45-9708-019B960494DF}">
-                  <a14:hiddenLine xmlns:a14="http://schemas.microsoft.com/office/drawing/2010/main" w="9525">
+                  <a14:hiddenLine xmlns:a14="http://schemas.microsoft.com/office/drawing/2010/main" xmlns="" w="9525">
                     <a:solidFill>
                       <a:srgbClr val="000000"/>
                     </a:solidFill>
@@ -11439,7 +11327,7 @@
               </a:ln>
               <a:extLst>
                 <a:ext uri="{91240B29-F687-4F45-9708-019B960494DF}">
-                  <a14:hiddenLine xmlns:a14="http://schemas.microsoft.com/office/drawing/2010/main" w="9525">
+                  <a14:hiddenLine xmlns:a14="http://schemas.microsoft.com/office/drawing/2010/main" xmlns="" w="9525">
                     <a:solidFill>
                       <a:srgbClr val="000000"/>
                     </a:solidFill>
@@ -11504,7 +11392,7 @@
               </a:ln>
               <a:extLst>
                 <a:ext uri="{91240B29-F687-4F45-9708-019B960494DF}">
-                  <a14:hiddenLine xmlns:a14="http://schemas.microsoft.com/office/drawing/2010/main" w="9525">
+                  <a14:hiddenLine xmlns:a14="http://schemas.microsoft.com/office/drawing/2010/main" xmlns="" w="9525">
                     <a:solidFill>
                       <a:srgbClr val="000000"/>
                     </a:solidFill>
@@ -11566,7 +11454,7 @@
               </a:ln>
               <a:extLst>
                 <a:ext uri="{91240B29-F687-4F45-9708-019B960494DF}">
-                  <a14:hiddenLine xmlns:a14="http://schemas.microsoft.com/office/drawing/2010/main" w="9525">
+                  <a14:hiddenLine xmlns:a14="http://schemas.microsoft.com/office/drawing/2010/main" xmlns="" w="9525">
                     <a:solidFill>
                       <a:srgbClr val="000000"/>
                     </a:solidFill>
@@ -11656,7 +11544,7 @@
               </a:ln>
               <a:extLst>
                 <a:ext uri="{91240B29-F687-4F45-9708-019B960494DF}">
-                  <a14:hiddenLine xmlns:a14="http://schemas.microsoft.com/office/drawing/2010/main" w="9525">
+                  <a14:hiddenLine xmlns:a14="http://schemas.microsoft.com/office/drawing/2010/main" xmlns="" w="9525">
                     <a:solidFill>
                       <a:srgbClr val="000000"/>
                     </a:solidFill>
@@ -11746,7 +11634,7 @@
               </a:ln>
               <a:extLst>
                 <a:ext uri="{91240B29-F687-4F45-9708-019B960494DF}">
-                  <a14:hiddenLine xmlns:a14="http://schemas.microsoft.com/office/drawing/2010/main" w="9525">
+                  <a14:hiddenLine xmlns:a14="http://schemas.microsoft.com/office/drawing/2010/main" xmlns="" w="9525">
                     <a:solidFill>
                       <a:srgbClr val="000000"/>
                     </a:solidFill>
@@ -11811,7 +11699,7 @@
               </a:ln>
               <a:extLst>
                 <a:ext uri="{91240B29-F687-4F45-9708-019B960494DF}">
-                  <a14:hiddenLine xmlns:a14="http://schemas.microsoft.com/office/drawing/2010/main" w="9525">
+                  <a14:hiddenLine xmlns:a14="http://schemas.microsoft.com/office/drawing/2010/main" xmlns="" w="9525">
                     <a:solidFill>
                       <a:srgbClr val="000000"/>
                     </a:solidFill>
@@ -11931,7 +11819,7 @@
               </a:ln>
               <a:extLst>
                 <a:ext uri="{91240B29-F687-4F45-9708-019B960494DF}">
-                  <a14:hiddenLine xmlns:a14="http://schemas.microsoft.com/office/drawing/2010/main" w="9525">
+                  <a14:hiddenLine xmlns:a14="http://schemas.microsoft.com/office/drawing/2010/main" xmlns="" w="9525">
                     <a:solidFill>
                       <a:srgbClr val="000000"/>
                     </a:solidFill>
@@ -12029,7 +11917,7 @@
               </a:ln>
               <a:extLst>
                 <a:ext uri="{91240B29-F687-4F45-9708-019B960494DF}">
-                  <a14:hiddenLine xmlns:a14="http://schemas.microsoft.com/office/drawing/2010/main" w="9525">
+                  <a14:hiddenLine xmlns:a14="http://schemas.microsoft.com/office/drawing/2010/main" xmlns="" w="9525">
                     <a:solidFill>
                       <a:srgbClr val="000000"/>
                     </a:solidFill>
@@ -12144,7 +12032,7 @@
               </a:ln>
               <a:extLst>
                 <a:ext uri="{91240B29-F687-4F45-9708-019B960494DF}">
-                  <a14:hiddenLine xmlns:a14="http://schemas.microsoft.com/office/drawing/2010/main" w="9525">
+                  <a14:hiddenLine xmlns:a14="http://schemas.microsoft.com/office/drawing/2010/main" xmlns="" w="9525">
                     <a:solidFill>
                       <a:srgbClr val="000000"/>
                     </a:solidFill>
@@ -12234,7 +12122,7 @@
               </a:ln>
               <a:extLst>
                 <a:ext uri="{91240B29-F687-4F45-9708-019B960494DF}">
-                  <a14:hiddenLine xmlns:a14="http://schemas.microsoft.com/office/drawing/2010/main" w="9525">
+                  <a14:hiddenLine xmlns:a14="http://schemas.microsoft.com/office/drawing/2010/main" xmlns="" w="9525">
                     <a:solidFill>
                       <a:srgbClr val="000000"/>
                     </a:solidFill>
@@ -12299,7 +12187,7 @@
               </a:ln>
               <a:extLst>
                 <a:ext uri="{91240B29-F687-4F45-9708-019B960494DF}">
-                  <a14:hiddenLine xmlns:a14="http://schemas.microsoft.com/office/drawing/2010/main" w="9525">
+                  <a14:hiddenLine xmlns:a14="http://schemas.microsoft.com/office/drawing/2010/main" xmlns="" w="9525">
                     <a:solidFill>
                       <a:srgbClr val="000000"/>
                     </a:solidFill>
@@ -12389,7 +12277,7 @@
               </a:ln>
               <a:extLst>
                 <a:ext uri="{91240B29-F687-4F45-9708-019B960494DF}">
-                  <a14:hiddenLine xmlns:a14="http://schemas.microsoft.com/office/drawing/2010/main" w="9525">
+                  <a14:hiddenLine xmlns:a14="http://schemas.microsoft.com/office/drawing/2010/main" xmlns="" w="9525">
                     <a:solidFill>
                       <a:srgbClr val="000000"/>
                     </a:solidFill>
@@ -12457,7 +12345,7 @@
               </a:ln>
               <a:extLst>
                 <a:ext uri="{91240B29-F687-4F45-9708-019B960494DF}">
-                  <a14:hiddenLine xmlns:a14="http://schemas.microsoft.com/office/drawing/2010/main" w="9525">
+                  <a14:hiddenLine xmlns:a14="http://schemas.microsoft.com/office/drawing/2010/main" xmlns="" w="9525">
                     <a:solidFill>
                       <a:srgbClr val="000000"/>
                     </a:solidFill>
@@ -12547,7 +12435,7 @@
               </a:ln>
               <a:extLst>
                 <a:ext uri="{91240B29-F687-4F45-9708-019B960494DF}">
-                  <a14:hiddenLine xmlns:a14="http://schemas.microsoft.com/office/drawing/2010/main" w="9525">
+                  <a14:hiddenLine xmlns:a14="http://schemas.microsoft.com/office/drawing/2010/main" xmlns="" w="9525">
                     <a:solidFill>
                       <a:srgbClr val="000000"/>
                     </a:solidFill>
@@ -12615,7 +12503,7 @@
               </a:ln>
               <a:extLst>
                 <a:ext uri="{91240B29-F687-4F45-9708-019B960494DF}">
-                  <a14:hiddenLine xmlns:a14="http://schemas.microsoft.com/office/drawing/2010/main" w="9525">
+                  <a14:hiddenLine xmlns:a14="http://schemas.microsoft.com/office/drawing/2010/main" xmlns="" w="9525">
                     <a:solidFill>
                       <a:srgbClr val="000000"/>
                     </a:solidFill>
@@ -12705,7 +12593,7 @@
               </a:ln>
               <a:extLst>
                 <a:ext uri="{91240B29-F687-4F45-9708-019B960494DF}">
-                  <a14:hiddenLine xmlns:a14="http://schemas.microsoft.com/office/drawing/2010/main" w="9525">
+                  <a14:hiddenLine xmlns:a14="http://schemas.microsoft.com/office/drawing/2010/main" xmlns="" w="9525">
                     <a:solidFill>
                       <a:srgbClr val="000000"/>
                     </a:solidFill>
@@ -12739,7 +12627,7 @@
               </a:ln>
               <a:extLst>
                 <a:ext uri="{91240B29-F687-4F45-9708-019B960494DF}">
-                  <a14:hiddenLine xmlns:a14="http://schemas.microsoft.com/office/drawing/2010/main" w="9525">
+                  <a14:hiddenLine xmlns:a14="http://schemas.microsoft.com/office/drawing/2010/main" xmlns="" w="9525">
                     <a:solidFill>
                       <a:srgbClr val="000000"/>
                     </a:solidFill>
@@ -12880,7 +12768,7 @@
             <a:fld id="{48A87A34-81AB-432B-8DAE-1953F412C126}" type="datetimeFigureOut">
               <a:rPr lang="en-US" dirty="0"/>
               <a:pPr/>
-              <a:t>6/13/2017</a:t>
+              <a:t>6/14/2017</a:t>
             </a:fld>
             <a:endParaRPr lang="en-US" dirty="0"/>
           </a:p>
@@ -13308,7 +13196,9 @@
         </p:nvSpPr>
         <p:spPr/>
         <p:txBody>
-          <a:bodyPr/>
+          <a:bodyPr>
+            <a:normAutofit fontScale="90000"/>
+          </a:bodyPr>
           <a:lstStyle/>
           <a:p>
             <a:r>
@@ -13417,9 +13307,1151 @@
     </p:spTree>
     <p:extLst>
       <p:ext uri="{BB962C8B-B14F-4D97-AF65-F5344CB8AC3E}">
-        <p14:creationId xmlns:p14="http://schemas.microsoft.com/office/powerpoint/2010/main" val="3856144342"/>
+        <p14:creationId xmlns:p14="http://schemas.microsoft.com/office/powerpoint/2010/main" xmlns="" val="3856144342"/>
       </p:ext>
     </p:extLst>
+  </p:cSld>
+  <p:clrMapOvr>
+    <a:masterClrMapping/>
+  </p:clrMapOvr>
+</p:sld>
+</file>
+
+<file path=ppt/slides/slide10.xml><?xml version="1.0" encoding="utf-8"?>
+<p:sld xmlns:a="http://schemas.openxmlformats.org/drawingml/2006/main" xmlns:r="http://schemas.openxmlformats.org/officeDocument/2006/relationships" xmlns:p="http://schemas.openxmlformats.org/presentationml/2006/main">
+  <p:cSld>
+    <p:spTree>
+      <p:nvGrpSpPr>
+        <p:cNvPr id="1" name=""/>
+        <p:cNvGrpSpPr/>
+        <p:nvPr/>
+      </p:nvGrpSpPr>
+      <p:grpSpPr>
+        <a:xfrm>
+          <a:off x="0" y="0"/>
+          <a:ext cx="0" cy="0"/>
+          <a:chOff x="0" y="0"/>
+          <a:chExt cx="0" cy="0"/>
+        </a:xfrm>
+      </p:grpSpPr>
+      <p:sp>
+        <p:nvSpPr>
+          <p:cNvPr id="2" name="Title 1"/>
+          <p:cNvSpPr>
+            <a:spLocks noGrp="1"/>
+          </p:cNvSpPr>
+          <p:nvPr>
+            <p:ph type="title"/>
+          </p:nvPr>
+        </p:nvSpPr>
+        <p:spPr/>
+        <p:txBody>
+          <a:bodyPr/>
+          <a:lstStyle/>
+          <a:p>
+            <a:r>
+              <a:rPr lang="pl-PL" dirty="0" smtClean="0"/>
+              <a:t>Test3</a:t>
+            </a:r>
+            <a:endParaRPr lang="en-US" dirty="0"/>
+          </a:p>
+        </p:txBody>
+      </p:sp>
+      <p:sp>
+        <p:nvSpPr>
+          <p:cNvPr id="3" name="Content Placeholder 2"/>
+          <p:cNvSpPr>
+            <a:spLocks noGrp="1"/>
+          </p:cNvSpPr>
+          <p:nvPr>
+            <p:ph idx="1"/>
+          </p:nvPr>
+        </p:nvSpPr>
+        <p:spPr>
+          <a:xfrm>
+            <a:off x="1086983" y="1966458"/>
+            <a:ext cx="9905999" cy="3541714"/>
+          </a:xfrm>
+        </p:spPr>
+        <p:txBody>
+          <a:bodyPr/>
+          <a:lstStyle/>
+          <a:p>
+            <a:pPr marL="0" indent="0"/>
+            <a:r>
+              <a:rPr lang="pl-PL" dirty="0" smtClean="0"/>
+              <a:t> </a:t>
+            </a:r>
+            <a:r>
+              <a:rPr lang="pl-PL" b="1" dirty="0" smtClean="0"/>
+              <a:t>A4Go cars</a:t>
+            </a:r>
+            <a:r>
+              <a:rPr lang="pl-PL" dirty="0" smtClean="0"/>
+              <a:t> : </a:t>
+            </a:r>
+            <a:r>
+              <a:rPr lang="pl-PL" dirty="0" smtClean="0"/>
+              <a:t>50</a:t>
+            </a:r>
+            <a:r>
+              <a:rPr lang="pl-PL" dirty="0" smtClean="0"/>
+              <a:t>% wszystkich samochodów</a:t>
+            </a:r>
+          </a:p>
+          <a:p>
+            <a:pPr marL="0" indent="0"/>
+            <a:r>
+              <a:rPr lang="pl-PL" dirty="0" smtClean="0"/>
+              <a:t> </a:t>
+            </a:r>
+            <a:r>
+              <a:rPr lang="pl-PL" b="1" dirty="0" smtClean="0"/>
+              <a:t>Liczba bramek</a:t>
+            </a:r>
+            <a:r>
+              <a:rPr lang="pl-PL" dirty="0" smtClean="0"/>
+              <a:t> : 5</a:t>
+            </a:r>
+          </a:p>
+          <a:p>
+            <a:pPr marL="0" indent="0"/>
+            <a:r>
+              <a:rPr lang="pl-PL" dirty="0" smtClean="0"/>
+              <a:t> </a:t>
+            </a:r>
+            <a:r>
+              <a:rPr lang="pl-PL" b="1" dirty="0" smtClean="0"/>
+              <a:t>Liczba bramek A4Go </a:t>
+            </a:r>
+            <a:r>
+              <a:rPr lang="pl-PL" dirty="0" smtClean="0"/>
+              <a:t>: </a:t>
+            </a:r>
+            <a:r>
+              <a:rPr lang="pl-PL" dirty="0" smtClean="0"/>
+              <a:t>2</a:t>
+            </a:r>
+            <a:endParaRPr lang="pl-PL" dirty="0" smtClean="0"/>
+          </a:p>
+          <a:p>
+            <a:pPr marL="0" indent="0"/>
+            <a:r>
+              <a:rPr lang="pl-PL" dirty="0" smtClean="0"/>
+              <a:t> </a:t>
+            </a:r>
+            <a:r>
+              <a:rPr lang="pl-PL" b="1" dirty="0" smtClean="0"/>
+              <a:t>Prędkość przybywania samochodów</a:t>
+            </a:r>
+            <a:r>
+              <a:rPr lang="pl-PL" dirty="0" smtClean="0"/>
+              <a:t> : 1 per </a:t>
+            </a:r>
+            <a:r>
+              <a:rPr lang="pl-PL" dirty="0" err="1" smtClean="0"/>
+              <a:t>tick</a:t>
+            </a:r>
+            <a:r>
+              <a:rPr lang="pl-PL" dirty="0" smtClean="0"/>
+              <a:t> </a:t>
+            </a:r>
+          </a:p>
+          <a:p>
+            <a:endParaRPr lang="en-US" dirty="0"/>
+          </a:p>
+        </p:txBody>
+      </p:sp>
+    </p:spTree>
+  </p:cSld>
+  <p:clrMapOvr>
+    <a:masterClrMapping/>
+  </p:clrMapOvr>
+</p:sld>
+</file>
+
+<file path=ppt/slides/slide11.xml><?xml version="1.0" encoding="utf-8"?>
+<p:sld xmlns:a="http://schemas.openxmlformats.org/drawingml/2006/main" xmlns:r="http://schemas.openxmlformats.org/officeDocument/2006/relationships" xmlns:p="http://schemas.openxmlformats.org/presentationml/2006/main">
+  <p:cSld>
+    <p:spTree>
+      <p:nvGrpSpPr>
+        <p:cNvPr id="1" name=""/>
+        <p:cNvGrpSpPr/>
+        <p:nvPr/>
+      </p:nvGrpSpPr>
+      <p:grpSpPr>
+        <a:xfrm>
+          <a:off x="0" y="0"/>
+          <a:ext cx="0" cy="0"/>
+          <a:chOff x="0" y="0"/>
+          <a:chExt cx="0" cy="0"/>
+        </a:xfrm>
+      </p:grpSpPr>
+      <p:sp>
+        <p:nvSpPr>
+          <p:cNvPr id="2" name="Title 1"/>
+          <p:cNvSpPr>
+            <a:spLocks noGrp="1"/>
+          </p:cNvSpPr>
+          <p:nvPr>
+            <p:ph type="title"/>
+          </p:nvPr>
+        </p:nvSpPr>
+        <p:spPr/>
+        <p:txBody>
+          <a:bodyPr/>
+          <a:lstStyle/>
+          <a:p>
+            <a:r>
+              <a:rPr lang="pl-PL" dirty="0" smtClean="0"/>
+              <a:t>Test3</a:t>
+            </a:r>
+            <a:endParaRPr lang="en-US" dirty="0"/>
+          </a:p>
+        </p:txBody>
+      </p:sp>
+      <p:pic>
+        <p:nvPicPr>
+          <p:cNvPr id="4" name="Content Placeholder 3" descr="2017-06-14_10-55-41.png"/>
+          <p:cNvPicPr>
+            <a:picLocks noGrp="1" noChangeAspect="1"/>
+          </p:cNvPicPr>
+          <p:nvPr>
+            <p:ph idx="1"/>
+          </p:nvPr>
+        </p:nvPicPr>
+        <p:blipFill>
+          <a:blip r:embed="rId2"/>
+          <a:stretch>
+            <a:fillRect/>
+          </a:stretch>
+        </p:blipFill>
+        <p:spPr>
+          <a:xfrm>
+            <a:off x="2982157" y="910545"/>
+            <a:ext cx="7391929" cy="5543946"/>
+          </a:xfrm>
+        </p:spPr>
+      </p:pic>
+    </p:spTree>
+  </p:cSld>
+  <p:clrMapOvr>
+    <a:masterClrMapping/>
+  </p:clrMapOvr>
+</p:sld>
+</file>
+
+<file path=ppt/slides/slide12.xml><?xml version="1.0" encoding="utf-8"?>
+<p:sld xmlns:a="http://schemas.openxmlformats.org/drawingml/2006/main" xmlns:r="http://schemas.openxmlformats.org/officeDocument/2006/relationships" xmlns:p="http://schemas.openxmlformats.org/presentationml/2006/main">
+  <p:cSld>
+    <p:spTree>
+      <p:nvGrpSpPr>
+        <p:cNvPr id="1" name=""/>
+        <p:cNvGrpSpPr/>
+        <p:nvPr/>
+      </p:nvGrpSpPr>
+      <p:grpSpPr>
+        <a:xfrm>
+          <a:off x="0" y="0"/>
+          <a:ext cx="0" cy="0"/>
+          <a:chOff x="0" y="0"/>
+          <a:chExt cx="0" cy="0"/>
+        </a:xfrm>
+      </p:grpSpPr>
+      <p:sp>
+        <p:nvSpPr>
+          <p:cNvPr id="2" name="Title 1"/>
+          <p:cNvSpPr>
+            <a:spLocks noGrp="1"/>
+          </p:cNvSpPr>
+          <p:nvPr>
+            <p:ph type="title"/>
+          </p:nvPr>
+        </p:nvSpPr>
+        <p:spPr/>
+        <p:txBody>
+          <a:bodyPr/>
+          <a:lstStyle/>
+          <a:p>
+            <a:r>
+              <a:rPr lang="pl-PL" dirty="0" smtClean="0"/>
+              <a:t>Test4</a:t>
+            </a:r>
+            <a:endParaRPr lang="en-US" dirty="0"/>
+          </a:p>
+        </p:txBody>
+      </p:sp>
+      <p:sp>
+        <p:nvSpPr>
+          <p:cNvPr id="3" name="Content Placeholder 2"/>
+          <p:cNvSpPr>
+            <a:spLocks noGrp="1"/>
+          </p:cNvSpPr>
+          <p:nvPr>
+            <p:ph idx="1"/>
+          </p:nvPr>
+        </p:nvSpPr>
+        <p:spPr>
+          <a:xfrm>
+            <a:off x="1086983" y="1966458"/>
+            <a:ext cx="9905999" cy="3541714"/>
+          </a:xfrm>
+        </p:spPr>
+        <p:txBody>
+          <a:bodyPr/>
+          <a:lstStyle/>
+          <a:p>
+            <a:pPr marL="0" indent="0"/>
+            <a:r>
+              <a:rPr lang="pl-PL" dirty="0" smtClean="0"/>
+              <a:t> </a:t>
+            </a:r>
+            <a:r>
+              <a:rPr lang="pl-PL" b="1" dirty="0" smtClean="0"/>
+              <a:t>A4Go cars</a:t>
+            </a:r>
+            <a:r>
+              <a:rPr lang="pl-PL" dirty="0" smtClean="0"/>
+              <a:t> : </a:t>
+            </a:r>
+            <a:r>
+              <a:rPr lang="pl-PL" dirty="0" smtClean="0"/>
+              <a:t>25% </a:t>
+            </a:r>
+            <a:r>
+              <a:rPr lang="pl-PL" dirty="0" smtClean="0"/>
+              <a:t>wszystkich samochodów</a:t>
+            </a:r>
+          </a:p>
+          <a:p>
+            <a:pPr marL="0" indent="0"/>
+            <a:r>
+              <a:rPr lang="pl-PL" dirty="0" smtClean="0"/>
+              <a:t> </a:t>
+            </a:r>
+            <a:r>
+              <a:rPr lang="pl-PL" b="1" dirty="0" smtClean="0"/>
+              <a:t>Liczba bramek</a:t>
+            </a:r>
+            <a:r>
+              <a:rPr lang="pl-PL" dirty="0" smtClean="0"/>
+              <a:t> : 5</a:t>
+            </a:r>
+          </a:p>
+          <a:p>
+            <a:pPr marL="0" indent="0"/>
+            <a:r>
+              <a:rPr lang="pl-PL" dirty="0" smtClean="0"/>
+              <a:t> </a:t>
+            </a:r>
+            <a:r>
+              <a:rPr lang="pl-PL" b="1" dirty="0" smtClean="0"/>
+              <a:t>Liczba bramek A4Go </a:t>
+            </a:r>
+            <a:r>
+              <a:rPr lang="pl-PL" dirty="0" smtClean="0"/>
+              <a:t>: 1</a:t>
+            </a:r>
+          </a:p>
+          <a:p>
+            <a:pPr marL="0" indent="0"/>
+            <a:r>
+              <a:rPr lang="pl-PL" dirty="0" smtClean="0"/>
+              <a:t> </a:t>
+            </a:r>
+            <a:r>
+              <a:rPr lang="pl-PL" b="1" dirty="0" smtClean="0"/>
+              <a:t>Prędkość przybywania samochodów</a:t>
+            </a:r>
+            <a:r>
+              <a:rPr lang="pl-PL" dirty="0" smtClean="0"/>
+              <a:t> : </a:t>
+            </a:r>
+            <a:r>
+              <a:rPr lang="pl-PL" dirty="0" smtClean="0"/>
+              <a:t>2 </a:t>
+            </a:r>
+            <a:r>
+              <a:rPr lang="pl-PL" dirty="0" smtClean="0"/>
+              <a:t>per </a:t>
+            </a:r>
+            <a:r>
+              <a:rPr lang="pl-PL" dirty="0" err="1" smtClean="0"/>
+              <a:t>tick</a:t>
+            </a:r>
+            <a:r>
+              <a:rPr lang="pl-PL" dirty="0" smtClean="0"/>
+              <a:t> </a:t>
+            </a:r>
+          </a:p>
+          <a:p>
+            <a:endParaRPr lang="en-US" dirty="0"/>
+          </a:p>
+        </p:txBody>
+      </p:sp>
+    </p:spTree>
+  </p:cSld>
+  <p:clrMapOvr>
+    <a:masterClrMapping/>
+  </p:clrMapOvr>
+</p:sld>
+</file>
+
+<file path=ppt/slides/slide13.xml><?xml version="1.0" encoding="utf-8"?>
+<p:sld xmlns:a="http://schemas.openxmlformats.org/drawingml/2006/main" xmlns:r="http://schemas.openxmlformats.org/officeDocument/2006/relationships" xmlns:p="http://schemas.openxmlformats.org/presentationml/2006/main">
+  <p:cSld>
+    <p:spTree>
+      <p:nvGrpSpPr>
+        <p:cNvPr id="1" name=""/>
+        <p:cNvGrpSpPr/>
+        <p:nvPr/>
+      </p:nvGrpSpPr>
+      <p:grpSpPr>
+        <a:xfrm>
+          <a:off x="0" y="0"/>
+          <a:ext cx="0" cy="0"/>
+          <a:chOff x="0" y="0"/>
+          <a:chExt cx="0" cy="0"/>
+        </a:xfrm>
+      </p:grpSpPr>
+      <p:sp>
+        <p:nvSpPr>
+          <p:cNvPr id="2" name="Title 1"/>
+          <p:cNvSpPr>
+            <a:spLocks noGrp="1"/>
+          </p:cNvSpPr>
+          <p:nvPr>
+            <p:ph type="title"/>
+          </p:nvPr>
+        </p:nvSpPr>
+        <p:spPr/>
+        <p:txBody>
+          <a:bodyPr/>
+          <a:lstStyle/>
+          <a:p>
+            <a:r>
+              <a:rPr lang="pl-PL" dirty="0" smtClean="0"/>
+              <a:t>Test4</a:t>
+            </a:r>
+            <a:endParaRPr lang="en-US" dirty="0"/>
+          </a:p>
+        </p:txBody>
+      </p:sp>
+      <p:pic>
+        <p:nvPicPr>
+          <p:cNvPr id="6" name="Content Placeholder 5" descr="2017-06-14_11-14-23.png"/>
+          <p:cNvPicPr>
+            <a:picLocks noGrp="1" noChangeAspect="1"/>
+          </p:cNvPicPr>
+          <p:nvPr>
+            <p:ph idx="1"/>
+          </p:nvPr>
+        </p:nvPicPr>
+        <p:blipFill>
+          <a:blip r:embed="rId2"/>
+          <a:stretch>
+            <a:fillRect/>
+          </a:stretch>
+        </p:blipFill>
+        <p:spPr>
+          <a:xfrm>
+            <a:off x="3199871" y="954088"/>
+            <a:ext cx="7598758" cy="5699068"/>
+          </a:xfrm>
+        </p:spPr>
+      </p:pic>
+    </p:spTree>
+  </p:cSld>
+  <p:clrMapOvr>
+    <a:masterClrMapping/>
+  </p:clrMapOvr>
+</p:sld>
+</file>
+
+<file path=ppt/slides/slide14.xml><?xml version="1.0" encoding="utf-8"?>
+<p:sld xmlns:a="http://schemas.openxmlformats.org/drawingml/2006/main" xmlns:r="http://schemas.openxmlformats.org/officeDocument/2006/relationships" xmlns:p="http://schemas.openxmlformats.org/presentationml/2006/main">
+  <p:cSld>
+    <p:spTree>
+      <p:nvGrpSpPr>
+        <p:cNvPr id="1" name=""/>
+        <p:cNvGrpSpPr/>
+        <p:nvPr/>
+      </p:nvGrpSpPr>
+      <p:grpSpPr>
+        <a:xfrm>
+          <a:off x="0" y="0"/>
+          <a:ext cx="0" cy="0"/>
+          <a:chOff x="0" y="0"/>
+          <a:chExt cx="0" cy="0"/>
+        </a:xfrm>
+      </p:grpSpPr>
+      <p:sp>
+        <p:nvSpPr>
+          <p:cNvPr id="2" name="Title 1"/>
+          <p:cNvSpPr>
+            <a:spLocks noGrp="1"/>
+          </p:cNvSpPr>
+          <p:nvPr>
+            <p:ph type="title"/>
+          </p:nvPr>
+        </p:nvSpPr>
+        <p:spPr/>
+        <p:txBody>
+          <a:bodyPr/>
+          <a:lstStyle/>
+          <a:p>
+            <a:r>
+              <a:rPr lang="pl-PL" dirty="0" smtClean="0"/>
+              <a:t>Test5</a:t>
+            </a:r>
+            <a:endParaRPr lang="en-US" dirty="0"/>
+          </a:p>
+        </p:txBody>
+      </p:sp>
+      <p:sp>
+        <p:nvSpPr>
+          <p:cNvPr id="3" name="Content Placeholder 2"/>
+          <p:cNvSpPr>
+            <a:spLocks noGrp="1"/>
+          </p:cNvSpPr>
+          <p:nvPr>
+            <p:ph idx="1"/>
+          </p:nvPr>
+        </p:nvSpPr>
+        <p:spPr>
+          <a:xfrm>
+            <a:off x="1086983" y="1966458"/>
+            <a:ext cx="9905999" cy="3541714"/>
+          </a:xfrm>
+        </p:spPr>
+        <p:txBody>
+          <a:bodyPr/>
+          <a:lstStyle/>
+          <a:p>
+            <a:pPr marL="0" indent="0"/>
+            <a:r>
+              <a:rPr lang="pl-PL" dirty="0" smtClean="0"/>
+              <a:t> </a:t>
+            </a:r>
+            <a:r>
+              <a:rPr lang="pl-PL" b="1" dirty="0" smtClean="0"/>
+              <a:t>A4Go cars</a:t>
+            </a:r>
+            <a:r>
+              <a:rPr lang="pl-PL" dirty="0" smtClean="0"/>
+              <a:t> : </a:t>
+            </a:r>
+            <a:r>
+              <a:rPr lang="pl-PL" dirty="0" smtClean="0"/>
+              <a:t>25% </a:t>
+            </a:r>
+            <a:r>
+              <a:rPr lang="pl-PL" dirty="0" smtClean="0"/>
+              <a:t>wszystkich samochodów</a:t>
+            </a:r>
+          </a:p>
+          <a:p>
+            <a:pPr marL="0" indent="0"/>
+            <a:r>
+              <a:rPr lang="pl-PL" dirty="0" smtClean="0"/>
+              <a:t> </a:t>
+            </a:r>
+            <a:r>
+              <a:rPr lang="pl-PL" b="1" dirty="0" smtClean="0"/>
+              <a:t>Liczba bramek</a:t>
+            </a:r>
+            <a:r>
+              <a:rPr lang="pl-PL" dirty="0" smtClean="0"/>
+              <a:t> : 5</a:t>
+            </a:r>
+          </a:p>
+          <a:p>
+            <a:pPr marL="0" indent="0"/>
+            <a:r>
+              <a:rPr lang="pl-PL" dirty="0" smtClean="0"/>
+              <a:t> </a:t>
+            </a:r>
+            <a:r>
+              <a:rPr lang="pl-PL" b="1" dirty="0" smtClean="0"/>
+              <a:t>Liczba bramek A4Go </a:t>
+            </a:r>
+            <a:r>
+              <a:rPr lang="pl-PL" dirty="0" smtClean="0"/>
+              <a:t>: </a:t>
+            </a:r>
+            <a:r>
+              <a:rPr lang="pl-PL" dirty="0" smtClean="0"/>
+              <a:t>2</a:t>
+            </a:r>
+            <a:endParaRPr lang="pl-PL" dirty="0" smtClean="0"/>
+          </a:p>
+          <a:p>
+            <a:pPr marL="0" indent="0"/>
+            <a:r>
+              <a:rPr lang="pl-PL" dirty="0" smtClean="0"/>
+              <a:t> </a:t>
+            </a:r>
+            <a:r>
+              <a:rPr lang="pl-PL" b="1" dirty="0" smtClean="0"/>
+              <a:t>Prędkość przybywania samochodów</a:t>
+            </a:r>
+            <a:r>
+              <a:rPr lang="pl-PL" dirty="0" smtClean="0"/>
+              <a:t> : </a:t>
+            </a:r>
+            <a:r>
+              <a:rPr lang="pl-PL" dirty="0" smtClean="0"/>
+              <a:t>2 </a:t>
+            </a:r>
+            <a:r>
+              <a:rPr lang="pl-PL" dirty="0" smtClean="0"/>
+              <a:t>per </a:t>
+            </a:r>
+            <a:r>
+              <a:rPr lang="pl-PL" dirty="0" err="1" smtClean="0"/>
+              <a:t>tick</a:t>
+            </a:r>
+            <a:r>
+              <a:rPr lang="pl-PL" dirty="0" smtClean="0"/>
+              <a:t> </a:t>
+            </a:r>
+          </a:p>
+          <a:p>
+            <a:endParaRPr lang="en-US" dirty="0"/>
+          </a:p>
+        </p:txBody>
+      </p:sp>
+    </p:spTree>
+  </p:cSld>
+  <p:clrMapOvr>
+    <a:masterClrMapping/>
+  </p:clrMapOvr>
+</p:sld>
+</file>
+
+<file path=ppt/slides/slide15.xml><?xml version="1.0" encoding="utf-8"?>
+<p:sld xmlns:a="http://schemas.openxmlformats.org/drawingml/2006/main" xmlns:r="http://schemas.openxmlformats.org/officeDocument/2006/relationships" xmlns:p="http://schemas.openxmlformats.org/presentationml/2006/main">
+  <p:cSld>
+    <p:spTree>
+      <p:nvGrpSpPr>
+        <p:cNvPr id="1" name=""/>
+        <p:cNvGrpSpPr/>
+        <p:nvPr/>
+      </p:nvGrpSpPr>
+      <p:grpSpPr>
+        <a:xfrm>
+          <a:off x="0" y="0"/>
+          <a:ext cx="0" cy="0"/>
+          <a:chOff x="0" y="0"/>
+          <a:chExt cx="0" cy="0"/>
+        </a:xfrm>
+      </p:grpSpPr>
+      <p:sp>
+        <p:nvSpPr>
+          <p:cNvPr id="2" name="Title 1"/>
+          <p:cNvSpPr>
+            <a:spLocks noGrp="1"/>
+          </p:cNvSpPr>
+          <p:nvPr>
+            <p:ph type="title"/>
+          </p:nvPr>
+        </p:nvSpPr>
+        <p:spPr/>
+        <p:txBody>
+          <a:bodyPr/>
+          <a:lstStyle/>
+          <a:p>
+            <a:r>
+              <a:rPr lang="pl-PL" dirty="0" smtClean="0"/>
+              <a:t>test5</a:t>
+            </a:r>
+            <a:endParaRPr lang="en-US" dirty="0"/>
+          </a:p>
+        </p:txBody>
+      </p:sp>
+      <p:pic>
+        <p:nvPicPr>
+          <p:cNvPr id="4" name="Content Placeholder 3" descr="2017-06-14_11-11-30.png"/>
+          <p:cNvPicPr>
+            <a:picLocks noGrp="1" noChangeAspect="1"/>
+          </p:cNvPicPr>
+          <p:nvPr>
+            <p:ph idx="1"/>
+          </p:nvPr>
+        </p:nvPicPr>
+        <p:blipFill>
+          <a:blip r:embed="rId2"/>
+          <a:stretch>
+            <a:fillRect/>
+          </a:stretch>
+        </p:blipFill>
+        <p:spPr>
+          <a:xfrm>
+            <a:off x="3210757" y="671058"/>
+            <a:ext cx="7805586" cy="5854189"/>
+          </a:xfrm>
+        </p:spPr>
+      </p:pic>
+    </p:spTree>
+  </p:cSld>
+  <p:clrMapOvr>
+    <a:masterClrMapping/>
+  </p:clrMapOvr>
+</p:sld>
+</file>
+
+<file path=ppt/slides/slide16.xml><?xml version="1.0" encoding="utf-8"?>
+<p:sld xmlns:a="http://schemas.openxmlformats.org/drawingml/2006/main" xmlns:r="http://schemas.openxmlformats.org/officeDocument/2006/relationships" xmlns:p="http://schemas.openxmlformats.org/presentationml/2006/main">
+  <p:cSld>
+    <p:spTree>
+      <p:nvGrpSpPr>
+        <p:cNvPr id="1" name=""/>
+        <p:cNvGrpSpPr/>
+        <p:nvPr/>
+      </p:nvGrpSpPr>
+      <p:grpSpPr>
+        <a:xfrm>
+          <a:off x="0" y="0"/>
+          <a:ext cx="0" cy="0"/>
+          <a:chOff x="0" y="0"/>
+          <a:chExt cx="0" cy="0"/>
+        </a:xfrm>
+      </p:grpSpPr>
+      <p:sp>
+        <p:nvSpPr>
+          <p:cNvPr id="2" name="Title 1"/>
+          <p:cNvSpPr>
+            <a:spLocks noGrp="1"/>
+          </p:cNvSpPr>
+          <p:nvPr>
+            <p:ph type="title"/>
+          </p:nvPr>
+        </p:nvSpPr>
+        <p:spPr/>
+        <p:txBody>
+          <a:bodyPr/>
+          <a:lstStyle/>
+          <a:p>
+            <a:r>
+              <a:rPr lang="pl-PL" dirty="0" smtClean="0"/>
+              <a:t>Test6</a:t>
+            </a:r>
+            <a:endParaRPr lang="en-US" dirty="0"/>
+          </a:p>
+        </p:txBody>
+      </p:sp>
+      <p:sp>
+        <p:nvSpPr>
+          <p:cNvPr id="3" name="Content Placeholder 2"/>
+          <p:cNvSpPr>
+            <a:spLocks noGrp="1"/>
+          </p:cNvSpPr>
+          <p:nvPr>
+            <p:ph idx="1"/>
+          </p:nvPr>
+        </p:nvSpPr>
+        <p:spPr>
+          <a:xfrm>
+            <a:off x="1086983" y="1966458"/>
+            <a:ext cx="9905999" cy="3541714"/>
+          </a:xfrm>
+        </p:spPr>
+        <p:txBody>
+          <a:bodyPr/>
+          <a:lstStyle/>
+          <a:p>
+            <a:pPr marL="0" indent="0"/>
+            <a:r>
+              <a:rPr lang="pl-PL" dirty="0" smtClean="0"/>
+              <a:t> </a:t>
+            </a:r>
+            <a:r>
+              <a:rPr lang="pl-PL" b="1" dirty="0" smtClean="0"/>
+              <a:t>A4Go cars</a:t>
+            </a:r>
+            <a:r>
+              <a:rPr lang="pl-PL" dirty="0" smtClean="0"/>
+              <a:t> : </a:t>
+            </a:r>
+            <a:r>
+              <a:rPr lang="pl-PL" dirty="0" smtClean="0"/>
+              <a:t>50% </a:t>
+            </a:r>
+            <a:r>
+              <a:rPr lang="pl-PL" dirty="0" smtClean="0"/>
+              <a:t>wszystkich samochodów</a:t>
+            </a:r>
+          </a:p>
+          <a:p>
+            <a:pPr marL="0" indent="0"/>
+            <a:r>
+              <a:rPr lang="pl-PL" dirty="0" smtClean="0"/>
+              <a:t> </a:t>
+            </a:r>
+            <a:r>
+              <a:rPr lang="pl-PL" b="1" dirty="0" smtClean="0"/>
+              <a:t>Liczba bramek</a:t>
+            </a:r>
+            <a:r>
+              <a:rPr lang="pl-PL" dirty="0" smtClean="0"/>
+              <a:t> : 5</a:t>
+            </a:r>
+          </a:p>
+          <a:p>
+            <a:pPr marL="0" indent="0"/>
+            <a:r>
+              <a:rPr lang="pl-PL" dirty="0" smtClean="0"/>
+              <a:t> </a:t>
+            </a:r>
+            <a:r>
+              <a:rPr lang="pl-PL" b="1" dirty="0" smtClean="0"/>
+              <a:t>Liczba bramek A4Go </a:t>
+            </a:r>
+            <a:r>
+              <a:rPr lang="pl-PL" dirty="0" smtClean="0"/>
+              <a:t>: </a:t>
+            </a:r>
+            <a:r>
+              <a:rPr lang="pl-PL" dirty="0" smtClean="0"/>
+              <a:t>2</a:t>
+            </a:r>
+            <a:endParaRPr lang="pl-PL" dirty="0" smtClean="0"/>
+          </a:p>
+          <a:p>
+            <a:pPr marL="0" indent="0"/>
+            <a:r>
+              <a:rPr lang="pl-PL" dirty="0" smtClean="0"/>
+              <a:t> </a:t>
+            </a:r>
+            <a:r>
+              <a:rPr lang="pl-PL" b="1" dirty="0" smtClean="0"/>
+              <a:t>Prędkość przybywania samochodów</a:t>
+            </a:r>
+            <a:r>
+              <a:rPr lang="pl-PL" dirty="0" smtClean="0"/>
+              <a:t> : </a:t>
+            </a:r>
+            <a:r>
+              <a:rPr lang="pl-PL" dirty="0" smtClean="0"/>
+              <a:t>2 </a:t>
+            </a:r>
+            <a:r>
+              <a:rPr lang="pl-PL" dirty="0" smtClean="0"/>
+              <a:t>per </a:t>
+            </a:r>
+            <a:r>
+              <a:rPr lang="pl-PL" dirty="0" err="1" smtClean="0"/>
+              <a:t>tick</a:t>
+            </a:r>
+            <a:r>
+              <a:rPr lang="pl-PL" dirty="0" smtClean="0"/>
+              <a:t> </a:t>
+            </a:r>
+          </a:p>
+          <a:p>
+            <a:endParaRPr lang="en-US" dirty="0"/>
+          </a:p>
+        </p:txBody>
+      </p:sp>
+    </p:spTree>
+  </p:cSld>
+  <p:clrMapOvr>
+    <a:masterClrMapping/>
+  </p:clrMapOvr>
+</p:sld>
+</file>
+
+<file path=ppt/slides/slide17.xml><?xml version="1.0" encoding="utf-8"?>
+<p:sld xmlns:a="http://schemas.openxmlformats.org/drawingml/2006/main" xmlns:r="http://schemas.openxmlformats.org/officeDocument/2006/relationships" xmlns:p="http://schemas.openxmlformats.org/presentationml/2006/main">
+  <p:cSld>
+    <p:spTree>
+      <p:nvGrpSpPr>
+        <p:cNvPr id="1" name=""/>
+        <p:cNvGrpSpPr/>
+        <p:nvPr/>
+      </p:nvGrpSpPr>
+      <p:grpSpPr>
+        <a:xfrm>
+          <a:off x="0" y="0"/>
+          <a:ext cx="0" cy="0"/>
+          <a:chOff x="0" y="0"/>
+          <a:chExt cx="0" cy="0"/>
+        </a:xfrm>
+      </p:grpSpPr>
+      <p:sp>
+        <p:nvSpPr>
+          <p:cNvPr id="2" name="Title 1"/>
+          <p:cNvSpPr>
+            <a:spLocks noGrp="1"/>
+          </p:cNvSpPr>
+          <p:nvPr>
+            <p:ph type="title"/>
+          </p:nvPr>
+        </p:nvSpPr>
+        <p:spPr/>
+        <p:txBody>
+          <a:bodyPr/>
+          <a:lstStyle/>
+          <a:p>
+            <a:r>
+              <a:rPr lang="pl-PL" dirty="0" smtClean="0"/>
+              <a:t>test6</a:t>
+            </a:r>
+            <a:endParaRPr lang="en-US" dirty="0"/>
+          </a:p>
+        </p:txBody>
+      </p:sp>
+      <p:pic>
+        <p:nvPicPr>
+          <p:cNvPr id="4" name="Content Placeholder 3" descr="2017-06-14_11-18-09.png"/>
+          <p:cNvPicPr>
+            <a:picLocks noGrp="1" noChangeAspect="1"/>
+          </p:cNvPicPr>
+          <p:nvPr>
+            <p:ph idx="1"/>
+          </p:nvPr>
+        </p:nvPicPr>
+        <p:blipFill>
+          <a:blip r:embed="rId2"/>
+          <a:stretch>
+            <a:fillRect/>
+          </a:stretch>
+        </p:blipFill>
+        <p:spPr>
+          <a:xfrm>
+            <a:off x="2927728" y="388031"/>
+            <a:ext cx="8365369" cy="6274026"/>
+          </a:xfrm>
+        </p:spPr>
+      </p:pic>
+    </p:spTree>
+  </p:cSld>
+  <p:clrMapOvr>
+    <a:masterClrMapping/>
+  </p:clrMapOvr>
+</p:sld>
+</file>
+
+<file path=ppt/slides/slide18.xml><?xml version="1.0" encoding="utf-8"?>
+<p:sld xmlns:a="http://schemas.openxmlformats.org/drawingml/2006/main" xmlns:r="http://schemas.openxmlformats.org/officeDocument/2006/relationships" xmlns:p="http://schemas.openxmlformats.org/presentationml/2006/main">
+  <p:cSld>
+    <p:spTree>
+      <p:nvGrpSpPr>
+        <p:cNvPr id="1" name=""/>
+        <p:cNvGrpSpPr/>
+        <p:nvPr/>
+      </p:nvGrpSpPr>
+      <p:grpSpPr>
+        <a:xfrm>
+          <a:off x="0" y="0"/>
+          <a:ext cx="0" cy="0"/>
+          <a:chOff x="0" y="0"/>
+          <a:chExt cx="0" cy="0"/>
+        </a:xfrm>
+      </p:grpSpPr>
+      <p:sp>
+        <p:nvSpPr>
+          <p:cNvPr id="2" name="Title 1"/>
+          <p:cNvSpPr>
+            <a:spLocks noGrp="1"/>
+          </p:cNvSpPr>
+          <p:nvPr>
+            <p:ph type="title"/>
+          </p:nvPr>
+        </p:nvSpPr>
+        <p:spPr/>
+        <p:txBody>
+          <a:bodyPr/>
+          <a:lstStyle/>
+          <a:p>
+            <a:r>
+              <a:rPr lang="pl-PL" dirty="0" smtClean="0"/>
+              <a:t>Test7</a:t>
+            </a:r>
+            <a:endParaRPr lang="en-US" dirty="0"/>
+          </a:p>
+        </p:txBody>
+      </p:sp>
+      <p:sp>
+        <p:nvSpPr>
+          <p:cNvPr id="3" name="Content Placeholder 2"/>
+          <p:cNvSpPr>
+            <a:spLocks noGrp="1"/>
+          </p:cNvSpPr>
+          <p:nvPr>
+            <p:ph idx="1"/>
+          </p:nvPr>
+        </p:nvSpPr>
+        <p:spPr>
+          <a:xfrm>
+            <a:off x="1086983" y="1966458"/>
+            <a:ext cx="9905999" cy="3541714"/>
+          </a:xfrm>
+        </p:spPr>
+        <p:txBody>
+          <a:bodyPr/>
+          <a:lstStyle/>
+          <a:p>
+            <a:pPr marL="0" indent="0"/>
+            <a:r>
+              <a:rPr lang="pl-PL" dirty="0" smtClean="0"/>
+              <a:t> </a:t>
+            </a:r>
+            <a:r>
+              <a:rPr lang="pl-PL" b="1" dirty="0" smtClean="0"/>
+              <a:t>A4Go cars</a:t>
+            </a:r>
+            <a:r>
+              <a:rPr lang="pl-PL" dirty="0" smtClean="0"/>
+              <a:t> : 0</a:t>
+            </a:r>
+            <a:r>
+              <a:rPr lang="pl-PL" dirty="0" smtClean="0"/>
+              <a:t>% </a:t>
+            </a:r>
+            <a:r>
+              <a:rPr lang="pl-PL" dirty="0" smtClean="0"/>
+              <a:t>wszystkich samochodów</a:t>
+            </a:r>
+          </a:p>
+          <a:p>
+            <a:pPr marL="0" indent="0"/>
+            <a:r>
+              <a:rPr lang="pl-PL" dirty="0" smtClean="0"/>
+              <a:t> </a:t>
+            </a:r>
+            <a:r>
+              <a:rPr lang="pl-PL" b="1" dirty="0" smtClean="0"/>
+              <a:t>Liczba bramek</a:t>
+            </a:r>
+            <a:r>
+              <a:rPr lang="pl-PL" dirty="0" smtClean="0"/>
+              <a:t> : 5</a:t>
+            </a:r>
+          </a:p>
+          <a:p>
+            <a:pPr marL="0" indent="0"/>
+            <a:r>
+              <a:rPr lang="pl-PL" dirty="0" smtClean="0"/>
+              <a:t> </a:t>
+            </a:r>
+            <a:r>
+              <a:rPr lang="pl-PL" b="1" dirty="0" smtClean="0"/>
+              <a:t>Liczba bramek A4Go </a:t>
+            </a:r>
+            <a:r>
+              <a:rPr lang="pl-PL" dirty="0" smtClean="0"/>
+              <a:t>: 0</a:t>
+            </a:r>
+          </a:p>
+          <a:p>
+            <a:pPr marL="0" indent="0"/>
+            <a:r>
+              <a:rPr lang="pl-PL" dirty="0" smtClean="0"/>
+              <a:t> </a:t>
+            </a:r>
+            <a:r>
+              <a:rPr lang="pl-PL" b="1" dirty="0" smtClean="0"/>
+              <a:t>Prędkość przybywania samochodów</a:t>
+            </a:r>
+            <a:r>
+              <a:rPr lang="pl-PL" dirty="0" smtClean="0"/>
+              <a:t> : </a:t>
+            </a:r>
+            <a:r>
+              <a:rPr lang="pl-PL" dirty="0" smtClean="0"/>
+              <a:t>2 </a:t>
+            </a:r>
+            <a:r>
+              <a:rPr lang="pl-PL" dirty="0" smtClean="0"/>
+              <a:t>per </a:t>
+            </a:r>
+            <a:r>
+              <a:rPr lang="pl-PL" dirty="0" err="1" smtClean="0"/>
+              <a:t>tick</a:t>
+            </a:r>
+            <a:r>
+              <a:rPr lang="pl-PL" dirty="0" smtClean="0"/>
+              <a:t> </a:t>
+            </a:r>
+          </a:p>
+          <a:p>
+            <a:endParaRPr lang="en-US" dirty="0"/>
+          </a:p>
+        </p:txBody>
+      </p:sp>
+    </p:spTree>
+  </p:cSld>
+  <p:clrMapOvr>
+    <a:masterClrMapping/>
+  </p:clrMapOvr>
+</p:sld>
+</file>
+
+<file path=ppt/slides/slide19.xml><?xml version="1.0" encoding="utf-8"?>
+<p:sld xmlns:a="http://schemas.openxmlformats.org/drawingml/2006/main" xmlns:r="http://schemas.openxmlformats.org/officeDocument/2006/relationships" xmlns:p="http://schemas.openxmlformats.org/presentationml/2006/main">
+  <p:cSld>
+    <p:spTree>
+      <p:nvGrpSpPr>
+        <p:cNvPr id="1" name=""/>
+        <p:cNvGrpSpPr/>
+        <p:nvPr/>
+      </p:nvGrpSpPr>
+      <p:grpSpPr>
+        <a:xfrm>
+          <a:off x="0" y="0"/>
+          <a:ext cx="0" cy="0"/>
+          <a:chOff x="0" y="0"/>
+          <a:chExt cx="0" cy="0"/>
+        </a:xfrm>
+      </p:grpSpPr>
+      <p:sp>
+        <p:nvSpPr>
+          <p:cNvPr id="2" name="Title 1"/>
+          <p:cNvSpPr>
+            <a:spLocks noGrp="1"/>
+          </p:cNvSpPr>
+          <p:nvPr>
+            <p:ph type="title"/>
+          </p:nvPr>
+        </p:nvSpPr>
+        <p:spPr/>
+        <p:txBody>
+          <a:bodyPr/>
+          <a:lstStyle/>
+          <a:p>
+            <a:r>
+              <a:rPr lang="pl-PL" dirty="0" smtClean="0"/>
+              <a:t>test7</a:t>
+            </a:r>
+            <a:endParaRPr lang="en-US" dirty="0"/>
+          </a:p>
+        </p:txBody>
+      </p:sp>
+      <p:pic>
+        <p:nvPicPr>
+          <p:cNvPr id="4" name="Content Placeholder 3" descr="2017-06-14_11-26-30.png"/>
+          <p:cNvPicPr>
+            <a:picLocks noGrp="1" noChangeAspect="1"/>
+          </p:cNvPicPr>
+          <p:nvPr>
+            <p:ph idx="1"/>
+          </p:nvPr>
+        </p:nvPicPr>
+        <p:blipFill>
+          <a:blip r:embed="rId2"/>
+          <a:stretch>
+            <a:fillRect/>
+          </a:stretch>
+        </p:blipFill>
+        <p:spPr>
+          <a:xfrm>
+            <a:off x="3003928" y="758145"/>
+            <a:ext cx="7511672" cy="5633754"/>
+          </a:xfrm>
+        </p:spPr>
+      </p:pic>
+    </p:spTree>
   </p:cSld>
   <p:clrMapOvr>
     <a:masterClrMapping/>
@@ -13499,7 +14531,43 @@
                 </a:solidFill>
                 <a:latin typeface="Tw Cen MT"/>
               </a:rPr>
-              <a:t>W ramach projektu symulowany będzie ruch samochodowy na autostradzie przed bramkami w celu zaobserwowania zależności ilości dostępnych bramek do długości powstającego korku.</a:t>
+              <a:t>W ramach projektu symulowany </a:t>
+            </a:r>
+            <a:r>
+              <a:rPr lang="en-US" dirty="0" err="1" smtClean="0">
+                <a:solidFill>
+                  <a:srgbClr val="FFFFFF"/>
+                </a:solidFill>
+                <a:latin typeface="Tw Cen MT"/>
+              </a:rPr>
+              <a:t>zosta</a:t>
+            </a:r>
+            <a:r>
+              <a:rPr lang="pl-PL" dirty="0" smtClean="0">
+                <a:solidFill>
+                  <a:srgbClr val="FFFFFF"/>
+                </a:solidFill>
+                <a:latin typeface="Tw Cen MT"/>
+              </a:rPr>
+              <a:t>ł</a:t>
+            </a:r>
+            <a:r>
+              <a:rPr lang="pl-PL" dirty="0" smtClean="0">
+                <a:solidFill>
+                  <a:srgbClr val="FFFFFF"/>
+                </a:solidFill>
+                <a:latin typeface="Tw Cen MT"/>
+              </a:rPr>
+              <a:t> </a:t>
+            </a:r>
+            <a:r>
+              <a:rPr lang="pl-PL" dirty="0">
+                <a:solidFill>
+                  <a:srgbClr val="FFFFFF"/>
+                </a:solidFill>
+                <a:latin typeface="Tw Cen MT"/>
+              </a:rPr>
+              <a:t>ruch samochodowy na autostradzie przed bramkami w celu zaobserwowania zależności ilości dostępnych bramek do długości powstającego korku.</a:t>
             </a:r>
           </a:p>
           <a:p>
@@ -13553,7 +14621,7 @@
         </p:blipFill>
         <p:spPr>
           <a:xfrm>
-            <a:off x="6021324" y="3486150"/>
+            <a:off x="6402324" y="3638550"/>
             <a:ext cx="4405745" cy="2936883"/>
           </a:xfrm>
           <a:prstGeom prst="rect">
@@ -13564,7 +14632,538 @@
     </p:spTree>
     <p:extLst>
       <p:ext uri="{BB962C8B-B14F-4D97-AF65-F5344CB8AC3E}">
-        <p14:creationId xmlns:p14="http://schemas.microsoft.com/office/powerpoint/2010/main" val="398741249"/>
+        <p14:creationId xmlns:p14="http://schemas.microsoft.com/office/powerpoint/2010/main" xmlns="" val="398741249"/>
+      </p:ext>
+    </p:extLst>
+  </p:cSld>
+  <p:clrMapOvr>
+    <a:masterClrMapping/>
+  </p:clrMapOvr>
+</p:sld>
+</file>
+
+<file path=ppt/slides/slide20.xml><?xml version="1.0" encoding="utf-8"?>
+<p:sld xmlns:a="http://schemas.openxmlformats.org/drawingml/2006/main" xmlns:r="http://schemas.openxmlformats.org/officeDocument/2006/relationships" xmlns:p="http://schemas.openxmlformats.org/presentationml/2006/main">
+  <p:cSld>
+    <p:spTree>
+      <p:nvGrpSpPr>
+        <p:cNvPr id="1" name=""/>
+        <p:cNvGrpSpPr/>
+        <p:nvPr/>
+      </p:nvGrpSpPr>
+      <p:grpSpPr>
+        <a:xfrm>
+          <a:off x="0" y="0"/>
+          <a:ext cx="0" cy="0"/>
+          <a:chOff x="0" y="0"/>
+          <a:chExt cx="0" cy="0"/>
+        </a:xfrm>
+      </p:grpSpPr>
+      <p:sp>
+        <p:nvSpPr>
+          <p:cNvPr id="2" name="Title 1"/>
+          <p:cNvSpPr>
+            <a:spLocks noGrp="1"/>
+          </p:cNvSpPr>
+          <p:nvPr>
+            <p:ph type="title"/>
+          </p:nvPr>
+        </p:nvSpPr>
+        <p:spPr/>
+        <p:txBody>
+          <a:bodyPr/>
+          <a:lstStyle/>
+          <a:p>
+            <a:r>
+              <a:rPr lang="pl-PL" dirty="0" smtClean="0"/>
+              <a:t>Test7</a:t>
+            </a:r>
+            <a:endParaRPr lang="en-US" dirty="0"/>
+          </a:p>
+        </p:txBody>
+      </p:sp>
+      <p:sp>
+        <p:nvSpPr>
+          <p:cNvPr id="3" name="Content Placeholder 2"/>
+          <p:cNvSpPr>
+            <a:spLocks noGrp="1"/>
+          </p:cNvSpPr>
+          <p:nvPr>
+            <p:ph idx="1"/>
+          </p:nvPr>
+        </p:nvSpPr>
+        <p:spPr>
+          <a:xfrm>
+            <a:off x="1086983" y="1966458"/>
+            <a:ext cx="9905999" cy="3541714"/>
+          </a:xfrm>
+        </p:spPr>
+        <p:txBody>
+          <a:bodyPr/>
+          <a:lstStyle/>
+          <a:p>
+            <a:pPr marL="0" indent="0"/>
+            <a:r>
+              <a:rPr lang="pl-PL" dirty="0" smtClean="0"/>
+              <a:t> </a:t>
+            </a:r>
+            <a:r>
+              <a:rPr lang="pl-PL" b="1" dirty="0" smtClean="0"/>
+              <a:t>A4Go cars</a:t>
+            </a:r>
+            <a:r>
+              <a:rPr lang="pl-PL" dirty="0" smtClean="0"/>
+              <a:t> : 0</a:t>
+            </a:r>
+            <a:r>
+              <a:rPr lang="pl-PL" dirty="0" smtClean="0"/>
+              <a:t>% </a:t>
+            </a:r>
+            <a:r>
+              <a:rPr lang="pl-PL" dirty="0" smtClean="0"/>
+              <a:t>wszystkich </a:t>
+            </a:r>
+            <a:r>
+              <a:rPr lang="pl-PL" dirty="0" smtClean="0"/>
+              <a:t>samochodów</a:t>
+            </a:r>
+          </a:p>
+          <a:p>
+            <a:pPr marL="0" indent="0"/>
+            <a:r>
+              <a:rPr lang="pl-PL" dirty="0" smtClean="0"/>
+              <a:t> </a:t>
+            </a:r>
+            <a:r>
+              <a:rPr lang="pl-PL" b="1" dirty="0" smtClean="0"/>
+              <a:t>Tylko niebieskie (mądre) samochody</a:t>
+            </a:r>
+            <a:endParaRPr lang="pl-PL" dirty="0" smtClean="0"/>
+          </a:p>
+          <a:p>
+            <a:pPr marL="0" indent="0"/>
+            <a:r>
+              <a:rPr lang="pl-PL" dirty="0" smtClean="0"/>
+              <a:t> </a:t>
+            </a:r>
+            <a:r>
+              <a:rPr lang="pl-PL" b="1" dirty="0" smtClean="0"/>
+              <a:t>Liczba bramek</a:t>
+            </a:r>
+            <a:r>
+              <a:rPr lang="pl-PL" dirty="0" smtClean="0"/>
+              <a:t> : 5</a:t>
+            </a:r>
+          </a:p>
+          <a:p>
+            <a:pPr marL="0" indent="0"/>
+            <a:r>
+              <a:rPr lang="pl-PL" dirty="0" smtClean="0"/>
+              <a:t> </a:t>
+            </a:r>
+            <a:r>
+              <a:rPr lang="pl-PL" b="1" dirty="0" smtClean="0"/>
+              <a:t>Liczba bramek A4Go </a:t>
+            </a:r>
+            <a:r>
+              <a:rPr lang="pl-PL" dirty="0" smtClean="0"/>
+              <a:t>: 0</a:t>
+            </a:r>
+          </a:p>
+          <a:p>
+            <a:pPr marL="0" indent="0"/>
+            <a:r>
+              <a:rPr lang="pl-PL" dirty="0" smtClean="0"/>
+              <a:t> </a:t>
+            </a:r>
+            <a:r>
+              <a:rPr lang="pl-PL" b="1" dirty="0" smtClean="0"/>
+              <a:t>Prędkość przybywania samochodów</a:t>
+            </a:r>
+            <a:r>
+              <a:rPr lang="pl-PL" dirty="0" smtClean="0"/>
+              <a:t> : </a:t>
+            </a:r>
+            <a:r>
+              <a:rPr lang="pl-PL" dirty="0" smtClean="0"/>
+              <a:t>2 </a:t>
+            </a:r>
+            <a:r>
+              <a:rPr lang="pl-PL" dirty="0" smtClean="0"/>
+              <a:t>per </a:t>
+            </a:r>
+            <a:r>
+              <a:rPr lang="pl-PL" dirty="0" err="1" smtClean="0"/>
+              <a:t>tick</a:t>
+            </a:r>
+            <a:r>
+              <a:rPr lang="pl-PL" dirty="0" smtClean="0"/>
+              <a:t> </a:t>
+            </a:r>
+          </a:p>
+          <a:p>
+            <a:endParaRPr lang="en-US" dirty="0"/>
+          </a:p>
+        </p:txBody>
+      </p:sp>
+    </p:spTree>
+  </p:cSld>
+  <p:clrMapOvr>
+    <a:masterClrMapping/>
+  </p:clrMapOvr>
+</p:sld>
+</file>
+
+<file path=ppt/slides/slide21.xml><?xml version="1.0" encoding="utf-8"?>
+<p:sld xmlns:a="http://schemas.openxmlformats.org/drawingml/2006/main" xmlns:r="http://schemas.openxmlformats.org/officeDocument/2006/relationships" xmlns:p="http://schemas.openxmlformats.org/presentationml/2006/main">
+  <p:cSld>
+    <p:spTree>
+      <p:nvGrpSpPr>
+        <p:cNvPr id="1" name=""/>
+        <p:cNvGrpSpPr/>
+        <p:nvPr/>
+      </p:nvGrpSpPr>
+      <p:grpSpPr>
+        <a:xfrm>
+          <a:off x="0" y="0"/>
+          <a:ext cx="0" cy="0"/>
+          <a:chOff x="0" y="0"/>
+          <a:chExt cx="0" cy="0"/>
+        </a:xfrm>
+      </p:grpSpPr>
+      <p:sp>
+        <p:nvSpPr>
+          <p:cNvPr id="2" name="Title 1"/>
+          <p:cNvSpPr>
+            <a:spLocks noGrp="1"/>
+          </p:cNvSpPr>
+          <p:nvPr>
+            <p:ph type="title"/>
+          </p:nvPr>
+        </p:nvSpPr>
+        <p:spPr/>
+        <p:txBody>
+          <a:bodyPr/>
+          <a:lstStyle/>
+          <a:p>
+            <a:r>
+              <a:rPr lang="pl-PL" dirty="0" smtClean="0"/>
+              <a:t>test7</a:t>
+            </a:r>
+            <a:endParaRPr lang="en-US" dirty="0"/>
+          </a:p>
+        </p:txBody>
+      </p:sp>
+      <p:pic>
+        <p:nvPicPr>
+          <p:cNvPr id="4" name="Content Placeholder 3" descr="2017-06-14_11-30-42.png"/>
+          <p:cNvPicPr>
+            <a:picLocks noGrp="1" noChangeAspect="1"/>
+          </p:cNvPicPr>
+          <p:nvPr>
+            <p:ph idx="1"/>
+          </p:nvPr>
+        </p:nvPicPr>
+        <p:blipFill>
+          <a:blip r:embed="rId2"/>
+          <a:stretch>
+            <a:fillRect/>
+          </a:stretch>
+        </p:blipFill>
+        <p:spPr>
+          <a:xfrm>
+            <a:off x="3265185" y="790801"/>
+            <a:ext cx="7576986" cy="5682739"/>
+          </a:xfrm>
+        </p:spPr>
+      </p:pic>
+    </p:spTree>
+  </p:cSld>
+  <p:clrMapOvr>
+    <a:masterClrMapping/>
+  </p:clrMapOvr>
+</p:sld>
+</file>
+
+<file path=ppt/slides/slide22.xml><?xml version="1.0" encoding="utf-8"?>
+<p:sld xmlns:a="http://schemas.openxmlformats.org/drawingml/2006/main" xmlns:r="http://schemas.openxmlformats.org/officeDocument/2006/relationships" xmlns:p="http://schemas.openxmlformats.org/presentationml/2006/main">
+  <p:cSld>
+    <p:spTree>
+      <p:nvGrpSpPr>
+        <p:cNvPr id="1" name=""/>
+        <p:cNvGrpSpPr/>
+        <p:nvPr/>
+      </p:nvGrpSpPr>
+      <p:grpSpPr>
+        <a:xfrm>
+          <a:off x="0" y="0"/>
+          <a:ext cx="0" cy="0"/>
+          <a:chOff x="0" y="0"/>
+          <a:chExt cx="0" cy="0"/>
+        </a:xfrm>
+      </p:grpSpPr>
+      <p:sp>
+        <p:nvSpPr>
+          <p:cNvPr id="2" name="Title 1"/>
+          <p:cNvSpPr>
+            <a:spLocks noGrp="1"/>
+          </p:cNvSpPr>
+          <p:nvPr>
+            <p:ph type="title"/>
+          </p:nvPr>
+        </p:nvSpPr>
+        <p:spPr/>
+        <p:txBody>
+          <a:bodyPr/>
+          <a:lstStyle/>
+          <a:p>
+            <a:r>
+              <a:rPr lang="pl-PL" dirty="0" smtClean="0"/>
+              <a:t>Test8</a:t>
+            </a:r>
+            <a:endParaRPr lang="en-US" dirty="0"/>
+          </a:p>
+        </p:txBody>
+      </p:sp>
+      <p:sp>
+        <p:nvSpPr>
+          <p:cNvPr id="3" name="Content Placeholder 2"/>
+          <p:cNvSpPr>
+            <a:spLocks noGrp="1"/>
+          </p:cNvSpPr>
+          <p:nvPr>
+            <p:ph idx="1"/>
+          </p:nvPr>
+        </p:nvSpPr>
+        <p:spPr>
+          <a:xfrm>
+            <a:off x="1086983" y="1966458"/>
+            <a:ext cx="9905999" cy="3541714"/>
+          </a:xfrm>
+        </p:spPr>
+        <p:txBody>
+          <a:bodyPr/>
+          <a:lstStyle/>
+          <a:p>
+            <a:pPr marL="0" indent="0"/>
+            <a:r>
+              <a:rPr lang="pl-PL" dirty="0" smtClean="0"/>
+              <a:t> </a:t>
+            </a:r>
+            <a:r>
+              <a:rPr lang="pl-PL" b="1" dirty="0" smtClean="0"/>
+              <a:t>A4Go cars</a:t>
+            </a:r>
+            <a:r>
+              <a:rPr lang="pl-PL" dirty="0" smtClean="0"/>
+              <a:t> : </a:t>
+            </a:r>
+            <a:r>
+              <a:rPr lang="pl-PL" dirty="0" smtClean="0"/>
+              <a:t>100% </a:t>
+            </a:r>
+            <a:r>
+              <a:rPr lang="pl-PL" dirty="0" smtClean="0"/>
+              <a:t>wszystkich </a:t>
+            </a:r>
+            <a:r>
+              <a:rPr lang="pl-PL" dirty="0" smtClean="0"/>
+              <a:t>samochodów</a:t>
+            </a:r>
+          </a:p>
+          <a:p>
+            <a:pPr marL="0" indent="0"/>
+            <a:r>
+              <a:rPr lang="pl-PL" b="1" dirty="0" smtClean="0"/>
+              <a:t> Liczba </a:t>
+            </a:r>
+            <a:r>
+              <a:rPr lang="pl-PL" b="1" dirty="0" smtClean="0"/>
+              <a:t>bramek</a:t>
+            </a:r>
+            <a:r>
+              <a:rPr lang="pl-PL" dirty="0" smtClean="0"/>
+              <a:t> : 5</a:t>
+            </a:r>
+          </a:p>
+          <a:p>
+            <a:pPr marL="0" indent="0"/>
+            <a:r>
+              <a:rPr lang="pl-PL" dirty="0" smtClean="0"/>
+              <a:t> </a:t>
+            </a:r>
+            <a:r>
+              <a:rPr lang="pl-PL" b="1" dirty="0" smtClean="0"/>
+              <a:t>Liczba bramek A4Go </a:t>
+            </a:r>
+            <a:r>
+              <a:rPr lang="pl-PL" dirty="0" smtClean="0"/>
+              <a:t>: </a:t>
+            </a:r>
+            <a:r>
+              <a:rPr lang="pl-PL" dirty="0" smtClean="0"/>
+              <a:t>5</a:t>
+            </a:r>
+            <a:endParaRPr lang="pl-PL" dirty="0" smtClean="0"/>
+          </a:p>
+          <a:p>
+            <a:pPr marL="0" indent="0"/>
+            <a:r>
+              <a:rPr lang="pl-PL" dirty="0" smtClean="0"/>
+              <a:t> </a:t>
+            </a:r>
+            <a:r>
+              <a:rPr lang="pl-PL" b="1" dirty="0" smtClean="0"/>
+              <a:t>Prędkość przybywania samochodów</a:t>
+            </a:r>
+            <a:r>
+              <a:rPr lang="pl-PL" dirty="0" smtClean="0"/>
+              <a:t> : 4</a:t>
+            </a:r>
+            <a:r>
+              <a:rPr lang="pl-PL" dirty="0" smtClean="0"/>
+              <a:t> </a:t>
+            </a:r>
+            <a:r>
+              <a:rPr lang="pl-PL" dirty="0" smtClean="0"/>
+              <a:t>per </a:t>
+            </a:r>
+            <a:r>
+              <a:rPr lang="pl-PL" dirty="0" err="1" smtClean="0"/>
+              <a:t>tick</a:t>
+            </a:r>
+            <a:r>
+              <a:rPr lang="pl-PL" dirty="0" smtClean="0"/>
+              <a:t> </a:t>
+            </a:r>
+          </a:p>
+          <a:p>
+            <a:endParaRPr lang="en-US" dirty="0"/>
+          </a:p>
+        </p:txBody>
+      </p:sp>
+    </p:spTree>
+  </p:cSld>
+  <p:clrMapOvr>
+    <a:masterClrMapping/>
+  </p:clrMapOvr>
+</p:sld>
+</file>
+
+<file path=ppt/slides/slide23.xml><?xml version="1.0" encoding="utf-8"?>
+<p:sld xmlns:a="http://schemas.openxmlformats.org/drawingml/2006/main" xmlns:r="http://schemas.openxmlformats.org/officeDocument/2006/relationships" xmlns:p="http://schemas.openxmlformats.org/presentationml/2006/main">
+  <p:cSld>
+    <p:spTree>
+      <p:nvGrpSpPr>
+        <p:cNvPr id="1" name=""/>
+        <p:cNvGrpSpPr/>
+        <p:nvPr/>
+      </p:nvGrpSpPr>
+      <p:grpSpPr>
+        <a:xfrm>
+          <a:off x="0" y="0"/>
+          <a:ext cx="0" cy="0"/>
+          <a:chOff x="0" y="0"/>
+          <a:chExt cx="0" cy="0"/>
+        </a:xfrm>
+      </p:grpSpPr>
+      <p:sp>
+        <p:nvSpPr>
+          <p:cNvPr id="2" name="Title 1"/>
+          <p:cNvSpPr>
+            <a:spLocks noGrp="1"/>
+          </p:cNvSpPr>
+          <p:nvPr>
+            <p:ph type="title"/>
+          </p:nvPr>
+        </p:nvSpPr>
+        <p:spPr/>
+        <p:txBody>
+          <a:bodyPr/>
+          <a:lstStyle/>
+          <a:p>
+            <a:r>
+              <a:rPr lang="pl-PL" dirty="0" smtClean="0"/>
+              <a:t>test8</a:t>
+            </a:r>
+            <a:endParaRPr lang="en-US" dirty="0"/>
+          </a:p>
+        </p:txBody>
+      </p:sp>
+      <p:pic>
+        <p:nvPicPr>
+          <p:cNvPr id="4" name="Content Placeholder 3" descr="2017-06-14_11-39-59.png"/>
+          <p:cNvPicPr>
+            <a:picLocks noGrp="1" noChangeAspect="1"/>
+          </p:cNvPicPr>
+          <p:nvPr>
+            <p:ph idx="1"/>
+          </p:nvPr>
+        </p:nvPicPr>
+        <p:blipFill>
+          <a:blip r:embed="rId2"/>
+          <a:stretch>
+            <a:fillRect/>
+          </a:stretch>
+        </p:blipFill>
+        <p:spPr>
+          <a:xfrm>
+            <a:off x="3091014" y="638402"/>
+            <a:ext cx="7359272" cy="5519454"/>
+          </a:xfrm>
+        </p:spPr>
+      </p:pic>
+    </p:spTree>
+  </p:cSld>
+  <p:clrMapOvr>
+    <a:masterClrMapping/>
+  </p:clrMapOvr>
+</p:sld>
+</file>
+
+<file path=ppt/slides/slide24.xml><?xml version="1.0" encoding="utf-8"?>
+<p:sld xmlns:a="http://schemas.openxmlformats.org/drawingml/2006/main" xmlns:r="http://schemas.openxmlformats.org/officeDocument/2006/relationships" xmlns:p="http://schemas.openxmlformats.org/presentationml/2006/main">
+  <p:cSld>
+    <p:spTree>
+      <p:nvGrpSpPr>
+        <p:cNvPr id="1" name=""/>
+        <p:cNvGrpSpPr/>
+        <p:nvPr/>
+      </p:nvGrpSpPr>
+      <p:grpSpPr>
+        <a:xfrm>
+          <a:off x="0" y="0"/>
+          <a:ext cx="0" cy="0"/>
+          <a:chOff x="0" y="0"/>
+          <a:chExt cx="0" cy="0"/>
+        </a:xfrm>
+      </p:grpSpPr>
+      <p:sp>
+        <p:nvSpPr>
+          <p:cNvPr id="2" name="Tytuł 1"/>
+          <p:cNvSpPr>
+            <a:spLocks noGrp="1"/>
+          </p:cNvSpPr>
+          <p:nvPr>
+            <p:ph type="title"/>
+          </p:nvPr>
+        </p:nvSpPr>
+        <p:spPr/>
+        <p:txBody>
+          <a:bodyPr/>
+          <a:lstStyle/>
+          <a:p>
+            <a:r>
+              <a:rPr lang="pl-PL" dirty="0"/>
+              <a:t>Dziękujemy za uwagę!</a:t>
+            </a:r>
+          </a:p>
+        </p:txBody>
+      </p:sp>
+    </p:spTree>
+    <p:extLst>
+      <p:ext uri="{BB962C8B-B14F-4D97-AF65-F5344CB8AC3E}">
+        <p14:creationId xmlns:p14="http://schemas.microsoft.com/office/powerpoint/2010/main" xmlns="" val="4012048983"/>
       </p:ext>
     </p:extLst>
   </p:cSld>
@@ -13672,7 +15271,7 @@
     </p:spTree>
     <p:extLst>
       <p:ext uri="{BB962C8B-B14F-4D97-AF65-F5344CB8AC3E}">
-        <p14:creationId xmlns:p14="http://schemas.microsoft.com/office/powerpoint/2010/main" val="53637488"/>
+        <p14:creationId xmlns:p14="http://schemas.microsoft.com/office/powerpoint/2010/main" xmlns="" val="53637488"/>
       </p:ext>
     </p:extLst>
   </p:cSld>
@@ -13715,92 +15314,15 @@
           <a:lstStyle/>
           <a:p>
             <a:r>
-              <a:rPr lang="pl-PL" dirty="0">
+              <a:rPr lang="pl-PL" dirty="0" smtClean="0">
                 <a:solidFill>
                   <a:srgbClr val="FFFFFF"/>
                 </a:solidFill>
                 <a:latin typeface="Tw Cen MT"/>
               </a:rPr>
-              <a:t>Cel projektu</a:t>
-            </a:r>
-          </a:p>
-        </p:txBody>
-      </p:sp>
-      <p:sp>
-        <p:nvSpPr>
-          <p:cNvPr id="3" name="Symbol zastępczy zawartości 2"/>
-          <p:cNvSpPr>
-            <a:spLocks noGrp="1"/>
-          </p:cNvSpPr>
-          <p:nvPr>
-            <p:ph idx="1"/>
-          </p:nvPr>
-        </p:nvSpPr>
-        <p:spPr/>
-        <p:txBody>
-          <a:bodyPr vert="horz" lIns="91440" tIns="45720" rIns="91440" bIns="45720" rtlCol="0" anchor="t">
-            <a:normAutofit/>
-          </a:bodyPr>
-          <a:lstStyle/>
-          <a:p>
-            <a:r>
-              <a:rPr lang="pl-PL" dirty="0">
-                <a:solidFill>
-                  <a:srgbClr val="FFFFFF"/>
-                </a:solidFill>
-                <a:latin typeface="Tw Cen MT"/>
-              </a:rPr>
-              <a:t>Czy większa ilość bramek zmniejszy długość powstającego zatoru?</a:t>
-            </a:r>
-          </a:p>
-          <a:p>
-            <a:r>
-              <a:rPr lang="pl-PL" dirty="0">
-                <a:solidFill>
-                  <a:srgbClr val="FFFFFF"/>
-                </a:solidFill>
-                <a:latin typeface="Tw Cen MT"/>
-              </a:rPr>
-              <a:t>Jak wprowadzenie systemu A4Go wpływa na ruch samochodów?</a:t>
-            </a:r>
-          </a:p>
-          <a:p>
-            <a:r>
-              <a:rPr lang="pl-PL" dirty="0">
-                <a:solidFill>
-                  <a:srgbClr val="FFFFFF"/>
-                </a:solidFill>
-                <a:latin typeface="Tw Cen MT"/>
-              </a:rPr>
-              <a:t>Porównanie transportu drogowego w dwóch scenariuszach: </a:t>
-            </a:r>
-          </a:p>
-          <a:p>
-            <a:pPr lvl="1"/>
-            <a:r>
-              <a:rPr lang="pl-PL" dirty="0">
-                <a:solidFill>
-                  <a:srgbClr val="FFFFFF"/>
-                </a:solidFill>
-                <a:latin typeface="Tw Cen MT"/>
-              </a:rPr>
-              <a:t>Mniejsza ilość bramek – wszystkie posiadają system A4Go</a:t>
-            </a:r>
-          </a:p>
-          <a:p>
-            <a:pPr lvl="1"/>
-            <a:r>
-              <a:rPr lang="pl-PL" dirty="0">
-                <a:solidFill>
-                  <a:srgbClr val="FFFFFF"/>
-                </a:solidFill>
-                <a:latin typeface="Tw Cen MT"/>
-              </a:rPr>
-              <a:t>Większa ilość bramek - żadna nie posiada systemu A4Go</a:t>
-            </a:r>
-          </a:p>
-          <a:p>
-            <a:endParaRPr lang="pl-PL">
+              <a:t>Prezentacja projektu</a:t>
+            </a:r>
+            <a:endParaRPr lang="pl-PL" dirty="0">
               <a:solidFill>
                 <a:srgbClr val="FFFFFF"/>
               </a:solidFill>
@@ -13809,10 +15331,33 @@
           </a:p>
         </p:txBody>
       </p:sp>
+      <p:pic>
+        <p:nvPicPr>
+          <p:cNvPr id="4" name="Content Placeholder 3" descr="projekt.PNG"/>
+          <p:cNvPicPr>
+            <a:picLocks noGrp="1" noChangeAspect="1"/>
+          </p:cNvPicPr>
+          <p:nvPr>
+            <p:ph idx="1"/>
+          </p:nvPr>
+        </p:nvPicPr>
+        <p:blipFill>
+          <a:blip r:embed="rId3"/>
+          <a:stretch>
+            <a:fillRect/>
+          </a:stretch>
+        </p:blipFill>
+        <p:spPr>
+          <a:xfrm>
+            <a:off x="1840799" y="1650773"/>
+            <a:ext cx="8391772" cy="5042066"/>
+          </a:xfrm>
+        </p:spPr>
+      </p:pic>
     </p:spTree>
     <p:extLst>
       <p:ext uri="{BB962C8B-B14F-4D97-AF65-F5344CB8AC3E}">
-        <p14:creationId xmlns:p14="http://schemas.microsoft.com/office/powerpoint/2010/main" val="343354986"/>
+        <p14:creationId xmlns:p14="http://schemas.microsoft.com/office/powerpoint/2010/main" xmlns="" val="343354986"/>
       </p:ext>
     </p:extLst>
   </p:cSld>
@@ -13855,97 +15400,17 @@
           <a:lstStyle/>
           <a:p>
             <a:r>
-              <a:rPr lang="pl-PL" dirty="0"/>
-              <a:t>Informacje techniczne</a:t>
-            </a:r>
-          </a:p>
-        </p:txBody>
-      </p:sp>
-      <p:sp>
-        <p:nvSpPr>
-          <p:cNvPr id="3" name="Symbol zastępczy zawartości 2"/>
-          <p:cNvSpPr>
-            <a:spLocks noGrp="1"/>
-          </p:cNvSpPr>
-          <p:nvPr>
-            <p:ph idx="1"/>
-          </p:nvPr>
-        </p:nvSpPr>
-        <p:spPr/>
-        <p:txBody>
-          <a:bodyPr vert="horz" lIns="91440" tIns="45720" rIns="91440" bIns="45720" rtlCol="0" anchor="t">
-            <a:normAutofit/>
-          </a:bodyPr>
-          <a:lstStyle/>
-          <a:p>
-            <a:pPr marL="0" indent="0">
-              <a:buNone/>
-            </a:pPr>
-            <a:r>
-              <a:rPr lang="pl-PL" dirty="0" err="1">
-                <a:solidFill>
-                  <a:srgbClr val="FFFFFF"/>
-                </a:solidFill>
-                <a:latin typeface="Tw Cen MT"/>
-              </a:rPr>
-              <a:t>Agenty</a:t>
-            </a:r>
-            <a:r>
-              <a:rPr lang="pl-PL" dirty="0">
-                <a:solidFill>
-                  <a:srgbClr val="FFFFFF"/>
-                </a:solidFill>
-                <a:latin typeface="Tw Cen MT"/>
-              </a:rPr>
-              <a:t> jako elementy ruchu drogowego:</a:t>
-            </a:r>
-          </a:p>
-          <a:p>
-            <a:r>
-              <a:rPr lang="pl-PL" dirty="0">
-                <a:latin typeface="Tw Cen MT"/>
-              </a:rPr>
-              <a:t>samochód z kartą A4GO,</a:t>
-            </a:r>
-          </a:p>
-          <a:p>
-            <a:r>
-              <a:rPr lang="pl-PL" dirty="0">
-                <a:latin typeface="Tw Cen MT"/>
-              </a:rPr>
-              <a:t>samochód bez karty,</a:t>
-            </a:r>
-          </a:p>
-          <a:p>
-            <a:r>
-              <a:rPr lang="pl-PL" dirty="0">
-                <a:latin typeface="Tw Cen MT"/>
-              </a:rPr>
-              <a:t>pas jezdni,</a:t>
-            </a:r>
-          </a:p>
-          <a:p>
-            <a:r>
-              <a:rPr lang="pl-PL" dirty="0">
-                <a:latin typeface="Tw Cen MT"/>
-              </a:rPr>
-              <a:t>bramka zwykła,</a:t>
-            </a:r>
-          </a:p>
-          <a:p>
-            <a:r>
-              <a:rPr lang="pl-PL" dirty="0">
-                <a:latin typeface="Tw Cen MT"/>
-              </a:rPr>
-              <a:t>bramka obsługująca A4GO.</a:t>
-            </a:r>
+              <a:rPr lang="pl-PL" dirty="0" smtClean="0"/>
+              <a:t>Wyniki eksperymentów</a:t>
+            </a:r>
+            <a:endParaRPr lang="pl-PL" dirty="0"/>
           </a:p>
         </p:txBody>
       </p:sp>
     </p:spTree>
     <p:extLst>
       <p:ext uri="{BB962C8B-B14F-4D97-AF65-F5344CB8AC3E}">
-        <p14:creationId xmlns:p14="http://schemas.microsoft.com/office/powerpoint/2010/main" val="1216268434"/>
+        <p14:creationId xmlns:p14="http://schemas.microsoft.com/office/powerpoint/2010/main" xmlns="" val="1533479115"/>
       </p:ext>
     </p:extLst>
   </p:cSld>
@@ -13988,11 +15453,10 @@
           <a:lstStyle/>
           <a:p>
             <a:r>
-              <a:rPr lang="pl-PL" dirty="0">
-                <a:latin typeface="TW Cen MT"/>
-              </a:rPr>
-              <a:t>Informacje techniczne cd</a:t>
-            </a:r>
+              <a:rPr lang="pl-PL" dirty="0" smtClean="0"/>
+              <a:t>Test1</a:t>
+            </a:r>
+            <a:endParaRPr lang="pl-PL" dirty="0"/>
           </a:p>
         </p:txBody>
       </p:sp>
@@ -14006,72 +15470,122 @@
             <p:ph idx="1"/>
           </p:nvPr>
         </p:nvSpPr>
-        <p:spPr/>
+        <p:spPr>
+          <a:xfrm>
+            <a:off x="1119641" y="1872343"/>
+            <a:ext cx="9905999" cy="4180115"/>
+          </a:xfrm>
+        </p:spPr>
         <p:txBody>
           <a:bodyPr vert="horz" lIns="91440" tIns="45720" rIns="91440" bIns="45720" rtlCol="0" anchor="t">
-            <a:normAutofit fontScale="85000" lnSpcReduction="20000"/>
+            <a:normAutofit/>
           </a:bodyPr>
           <a:lstStyle/>
           <a:p>
-            <a:pPr marL="0" indent="0">
-              <a:buNone/>
-            </a:pPr>
-            <a:r>
-              <a:rPr lang="pl-PL" dirty="0"/>
-              <a:t>Parametry symulacji:</a:t>
-            </a:r>
-          </a:p>
-          <a:p>
-            <a:r>
-              <a:rPr lang="pl-PL" dirty="0"/>
-              <a:t>tempo przyrostu liczby samochodów (z kartą A4GO),</a:t>
-            </a:r>
-          </a:p>
-          <a:p>
-            <a:r>
-              <a:rPr lang="pl-PL" dirty="0"/>
-              <a:t>liczba bramek (obsługujących A4GO),</a:t>
-            </a:r>
-          </a:p>
-          <a:p>
-            <a:r>
-              <a:rPr lang="pl-PL" dirty="0"/>
-              <a:t>liczba pasów jezdni,</a:t>
-            </a:r>
-          </a:p>
-          <a:p>
-            <a:r>
-              <a:rPr lang="pl-PL" dirty="0"/>
-              <a:t>prędkości samochodów,</a:t>
-            </a:r>
-          </a:p>
-          <a:p>
-            <a:r>
-              <a:rPr lang="pl-PL" dirty="0"/>
-              <a:t>czasy spędzone na bramkach,</a:t>
-            </a:r>
-          </a:p>
-          <a:p>
-            <a:r>
-              <a:rPr lang="pl-PL" dirty="0"/>
-              <a:t>długość jezdni przed bramkami,</a:t>
-            </a:r>
-          </a:p>
-          <a:p>
-            <a:r>
-              <a:rPr lang="pl-PL" dirty="0"/>
-              <a:t>strategie kierowców.</a:t>
-            </a:r>
-          </a:p>
-          <a:p>
-            <a:endParaRPr lang="pl-PL" dirty="0"/>
+            <a:pPr marL="0" indent="0"/>
+            <a:r>
+              <a:rPr lang="pl-PL" dirty="0" smtClean="0">
+                <a:latin typeface="Tw Cen MT"/>
+              </a:rPr>
+              <a:t> </a:t>
+            </a:r>
+            <a:r>
+              <a:rPr lang="pl-PL" b="1" dirty="0" smtClean="0">
+                <a:latin typeface="Tw Cen MT"/>
+              </a:rPr>
+              <a:t>A4Go cars</a:t>
+            </a:r>
+            <a:r>
+              <a:rPr lang="pl-PL" dirty="0" smtClean="0">
+                <a:latin typeface="Tw Cen MT"/>
+              </a:rPr>
+              <a:t> : 20% wszystkich samochodów</a:t>
+            </a:r>
+          </a:p>
+          <a:p>
+            <a:pPr marL="0" indent="0"/>
+            <a:r>
+              <a:rPr lang="pl-PL" dirty="0" smtClean="0">
+                <a:latin typeface="Tw Cen MT"/>
+              </a:rPr>
+              <a:t> </a:t>
+            </a:r>
+            <a:r>
+              <a:rPr lang="pl-PL" b="1" dirty="0" smtClean="0">
+                <a:latin typeface="Tw Cen MT"/>
+              </a:rPr>
+              <a:t>Liczba bramek</a:t>
+            </a:r>
+            <a:r>
+              <a:rPr lang="pl-PL" dirty="0" smtClean="0">
+                <a:latin typeface="Tw Cen MT"/>
+              </a:rPr>
+              <a:t> : 5</a:t>
+            </a:r>
+          </a:p>
+          <a:p>
+            <a:pPr marL="0" indent="0"/>
+            <a:r>
+              <a:rPr lang="pl-PL" dirty="0" smtClean="0">
+                <a:latin typeface="Tw Cen MT"/>
+              </a:rPr>
+              <a:t> </a:t>
+            </a:r>
+            <a:r>
+              <a:rPr lang="pl-PL" b="1" dirty="0" smtClean="0">
+                <a:latin typeface="Tw Cen MT"/>
+              </a:rPr>
+              <a:t>Liczba bramek A4Go </a:t>
+            </a:r>
+            <a:r>
+              <a:rPr lang="pl-PL" dirty="0" smtClean="0">
+                <a:latin typeface="Tw Cen MT"/>
+              </a:rPr>
+              <a:t>: 1</a:t>
+            </a:r>
+          </a:p>
+          <a:p>
+            <a:pPr marL="0" indent="0"/>
+            <a:r>
+              <a:rPr lang="pl-PL" dirty="0" smtClean="0">
+                <a:latin typeface="Tw Cen MT"/>
+              </a:rPr>
+              <a:t> </a:t>
+            </a:r>
+            <a:r>
+              <a:rPr lang="pl-PL" b="1" dirty="0" smtClean="0">
+                <a:latin typeface="Tw Cen MT"/>
+              </a:rPr>
+              <a:t>Prędkość przybywania samochodów</a:t>
+            </a:r>
+            <a:r>
+              <a:rPr lang="pl-PL" dirty="0" smtClean="0">
+                <a:latin typeface="Tw Cen MT"/>
+              </a:rPr>
+              <a:t> : 1 per </a:t>
+            </a:r>
+            <a:r>
+              <a:rPr lang="pl-PL" dirty="0" err="1" smtClean="0">
+                <a:latin typeface="Tw Cen MT"/>
+              </a:rPr>
+              <a:t>tick</a:t>
+            </a:r>
+            <a:r>
+              <a:rPr lang="pl-PL" dirty="0" smtClean="0">
+                <a:latin typeface="Tw Cen MT"/>
+              </a:rPr>
+              <a:t> </a:t>
+            </a:r>
+            <a:endParaRPr lang="pl-PL" dirty="0">
+              <a:latin typeface="Tw Cen MT"/>
+            </a:endParaRPr>
           </a:p>
         </p:txBody>
       </p:sp>
     </p:spTree>
     <p:extLst>
       <p:ext uri="{BB962C8B-B14F-4D97-AF65-F5344CB8AC3E}">
-        <p14:creationId xmlns:p14="http://schemas.microsoft.com/office/powerpoint/2010/main" val="3756911350"/>
+        <p14:creationId xmlns:p14="http://schemas.microsoft.com/office/powerpoint/2010/main" xmlns="" val="1216268434"/>
       </p:ext>
     </p:extLst>
   </p:cSld>
@@ -14100,7 +15614,7 @@
       </p:grpSpPr>
       <p:sp>
         <p:nvSpPr>
-          <p:cNvPr id="2" name="Tytuł 1"/>
+          <p:cNvPr id="2" name="Title 1"/>
           <p:cNvSpPr>
             <a:spLocks noGrp="1"/>
           </p:cNvSpPr>
@@ -14114,87 +15628,37 @@
           <a:lstStyle/>
           <a:p>
             <a:r>
-              <a:rPr lang="pl-PL" dirty="0"/>
-              <a:t>technologie</a:t>
-            </a:r>
-          </a:p>
-        </p:txBody>
-      </p:sp>
-      <p:sp>
-        <p:nvSpPr>
-          <p:cNvPr id="3" name="Symbol zastępczy zawartości 2"/>
-          <p:cNvSpPr>
-            <a:spLocks noGrp="1"/>
-          </p:cNvSpPr>
-          <p:nvPr>
-            <p:ph idx="1"/>
-          </p:nvPr>
-        </p:nvSpPr>
-        <p:spPr/>
-        <p:txBody>
-          <a:bodyPr vert="horz" lIns="91440" tIns="45720" rIns="91440" bIns="45720" rtlCol="0" anchor="t">
-            <a:normAutofit/>
-          </a:bodyPr>
-          <a:lstStyle/>
-          <a:p>
-            <a:pPr marL="0" indent="0">
-              <a:buNone/>
-            </a:pPr>
-            <a:r>
-              <a:rPr lang="pl-PL" dirty="0" err="1"/>
-              <a:t>RePast</a:t>
-            </a:r>
-            <a:r>
-              <a:rPr lang="pl-PL" dirty="0"/>
-              <a:t>:</a:t>
-            </a:r>
-          </a:p>
-          <a:p>
-            <a:r>
-              <a:rPr lang="pl-PL" dirty="0">
-                <a:latin typeface="TW Cen MT"/>
-              </a:rPr>
-              <a:t>tworzenie agentów</a:t>
-            </a:r>
-          </a:p>
-          <a:p>
-            <a:r>
-              <a:rPr lang="pl-PL" dirty="0"/>
-              <a:t>wizualizacja modelu</a:t>
-            </a:r>
+              <a:rPr lang="pl-PL" dirty="0" smtClean="0"/>
+              <a:t>test1</a:t>
+            </a:r>
+            <a:endParaRPr lang="en-US" dirty="0"/>
           </a:p>
         </p:txBody>
       </p:sp>
       <p:pic>
         <p:nvPicPr>
-          <p:cNvPr id="5" name="Obraz 4" descr="repast.jpg"/>
+          <p:cNvPr id="4" name="Content Placeholder 3" descr="2017-06-14_10-07-53.png"/>
           <p:cNvPicPr>
-            <a:picLocks noChangeAspect="1"/>
+            <a:picLocks noGrp="1" noChangeAspect="1"/>
           </p:cNvPicPr>
-          <p:nvPr/>
+          <p:nvPr>
+            <p:ph idx="1"/>
+          </p:nvPr>
         </p:nvPicPr>
         <p:blipFill>
-          <a:blip r:embed="rId3"/>
+          <a:blip r:embed="rId2"/>
           <a:stretch>
             <a:fillRect/>
           </a:stretch>
         </p:blipFill>
         <p:spPr>
           <a:xfrm>
-            <a:off x="5602701" y="2705100"/>
-            <a:ext cx="4374291" cy="1730643"/>
+            <a:off x="2862943" y="638798"/>
+            <a:ext cx="7990113" cy="5992585"/>
           </a:xfrm>
-          <a:prstGeom prst="rect">
-            <a:avLst/>
-          </a:prstGeom>
         </p:spPr>
       </p:pic>
     </p:spTree>
-    <p:extLst>
-      <p:ext uri="{BB962C8B-B14F-4D97-AF65-F5344CB8AC3E}">
-        <p14:creationId xmlns:p14="http://schemas.microsoft.com/office/powerpoint/2010/main" val="1123249225"/>
-      </p:ext>
-    </p:extLst>
   </p:cSld>
   <p:clrMapOvr>
     <a:masterClrMapping/>
@@ -14221,7 +15685,7 @@
       </p:grpSpPr>
       <p:sp>
         <p:nvSpPr>
-          <p:cNvPr id="2" name="Tytuł 1"/>
+          <p:cNvPr id="2" name="Title 1"/>
           <p:cNvSpPr>
             <a:spLocks noGrp="1"/>
           </p:cNvSpPr>
@@ -14235,16 +15699,16 @@
           <a:lstStyle/>
           <a:p>
             <a:r>
-              <a:rPr lang="pl-PL" smtClean="0"/>
-              <a:t>Wyniki eksperymentów</a:t>
-            </a:r>
-            <a:endParaRPr lang="pl-PL"/>
+              <a:rPr lang="pl-PL" dirty="0" smtClean="0"/>
+              <a:t>Test2</a:t>
+            </a:r>
+            <a:endParaRPr lang="en-US" dirty="0"/>
           </a:p>
         </p:txBody>
       </p:sp>
       <p:sp>
         <p:nvSpPr>
-          <p:cNvPr id="3" name="Symbol zastępczy zawartości 2"/>
+          <p:cNvPr id="3" name="Content Placeholder 2"/>
           <p:cNvSpPr>
             <a:spLocks noGrp="1"/>
           </p:cNvSpPr>
@@ -14252,21 +15716,97 @@
             <p:ph idx="1"/>
           </p:nvPr>
         </p:nvSpPr>
-        <p:spPr/>
+        <p:spPr>
+          <a:xfrm>
+            <a:off x="1086983" y="1966458"/>
+            <a:ext cx="9905999" cy="3541714"/>
+          </a:xfrm>
+        </p:spPr>
         <p:txBody>
           <a:bodyPr/>
           <a:lstStyle/>
           <a:p>
-            <a:endParaRPr lang="pl-PL"/>
+            <a:pPr marL="0" indent="0"/>
+            <a:r>
+              <a:rPr lang="pl-PL" dirty="0" smtClean="0"/>
+              <a:t> </a:t>
+            </a:r>
+            <a:r>
+              <a:rPr lang="pl-PL" b="1" dirty="0" smtClean="0"/>
+              <a:t>A4Go cars</a:t>
+            </a:r>
+            <a:r>
+              <a:rPr lang="pl-PL" dirty="0" smtClean="0"/>
+              <a:t> : </a:t>
+            </a:r>
+            <a:r>
+              <a:rPr lang="pl-PL" dirty="0" smtClean="0"/>
+              <a:t>50</a:t>
+            </a:r>
+            <a:r>
+              <a:rPr lang="pl-PL" dirty="0" smtClean="0"/>
+              <a:t>% wszystkich samochodów</a:t>
+            </a:r>
+          </a:p>
+          <a:p>
+            <a:pPr marL="0" indent="0"/>
+            <a:r>
+              <a:rPr lang="pl-PL" dirty="0" smtClean="0"/>
+              <a:t> </a:t>
+            </a:r>
+            <a:r>
+              <a:rPr lang="pl-PL" b="1" dirty="0" smtClean="0"/>
+              <a:t>Liczba bramek</a:t>
+            </a:r>
+            <a:r>
+              <a:rPr lang="pl-PL" dirty="0" smtClean="0"/>
+              <a:t> : 5</a:t>
+            </a:r>
+          </a:p>
+          <a:p>
+            <a:pPr marL="0" indent="0"/>
+            <a:r>
+              <a:rPr lang="pl-PL" dirty="0" smtClean="0"/>
+              <a:t> </a:t>
+            </a:r>
+            <a:r>
+              <a:rPr lang="pl-PL" b="1" dirty="0" smtClean="0"/>
+              <a:t>Liczba bramek A4Go </a:t>
+            </a:r>
+            <a:r>
+              <a:rPr lang="pl-PL" dirty="0" smtClean="0"/>
+              <a:t>: 1</a:t>
+            </a:r>
+          </a:p>
+          <a:p>
+            <a:pPr marL="0" indent="0"/>
+            <a:r>
+              <a:rPr lang="pl-PL" dirty="0" smtClean="0"/>
+              <a:t> </a:t>
+            </a:r>
+            <a:r>
+              <a:rPr lang="pl-PL" b="1" dirty="0" smtClean="0"/>
+              <a:t>Prędkość przybywania samochodów</a:t>
+            </a:r>
+            <a:r>
+              <a:rPr lang="pl-PL" dirty="0" smtClean="0"/>
+              <a:t> : 1 per </a:t>
+            </a:r>
+            <a:r>
+              <a:rPr lang="pl-PL" dirty="0" err="1" smtClean="0"/>
+              <a:t>tick</a:t>
+            </a:r>
+            <a:r>
+              <a:rPr lang="pl-PL" dirty="0" smtClean="0"/>
+              <a:t> </a:t>
+            </a:r>
+          </a:p>
+          <a:p>
+            <a:endParaRPr lang="en-US" dirty="0"/>
           </a:p>
         </p:txBody>
       </p:sp>
     </p:spTree>
-    <p:extLst>
-      <p:ext uri="{BB962C8B-B14F-4D97-AF65-F5344CB8AC3E}">
-        <p14:creationId xmlns:p14="http://schemas.microsoft.com/office/powerpoint/2010/main" val="1533479115"/>
-      </p:ext>
-    </p:extLst>
   </p:cSld>
   <p:clrMapOvr>
     <a:masterClrMapping/>
@@ -14293,7 +15833,7 @@
       </p:grpSpPr>
       <p:sp>
         <p:nvSpPr>
-          <p:cNvPr id="2" name="Tytuł 1"/>
+          <p:cNvPr id="2" name="Title 1"/>
           <p:cNvSpPr>
             <a:spLocks noGrp="1"/>
           </p:cNvSpPr>
@@ -14307,18 +15847,37 @@
           <a:lstStyle/>
           <a:p>
             <a:r>
-              <a:rPr lang="pl-PL" dirty="0"/>
-              <a:t>Dziękujemy za uwagę!</a:t>
-            </a:r>
+              <a:rPr lang="pl-PL" dirty="0" smtClean="0"/>
+              <a:t>Test2</a:t>
+            </a:r>
+            <a:endParaRPr lang="en-US" dirty="0"/>
           </a:p>
         </p:txBody>
       </p:sp>
+      <p:pic>
+        <p:nvPicPr>
+          <p:cNvPr id="4" name="Content Placeholder 3" descr="2017-06-14_10-40-20.png"/>
+          <p:cNvPicPr>
+            <a:picLocks noGrp="1" noChangeAspect="1"/>
+          </p:cNvPicPr>
+          <p:nvPr>
+            <p:ph idx="1"/>
+          </p:nvPr>
+        </p:nvPicPr>
+        <p:blipFill>
+          <a:blip r:embed="rId2"/>
+          <a:stretch>
+            <a:fillRect/>
+          </a:stretch>
+        </p:blipFill>
+        <p:spPr>
+          <a:xfrm>
+            <a:off x="3308728" y="997630"/>
+            <a:ext cx="6956501" cy="5217375"/>
+          </a:xfrm>
+        </p:spPr>
+      </p:pic>
     </p:spTree>
-    <p:extLst>
-      <p:ext uri="{BB962C8B-B14F-4D97-AF65-F5344CB8AC3E}">
-        <p14:creationId xmlns:p14="http://schemas.microsoft.com/office/powerpoint/2010/main" val="4012048983"/>
-      </p:ext>
-    </p:extLst>
   </p:cSld>
   <p:clrMapOvr>
     <a:masterClrMapping/>
@@ -14571,7 +16130,7 @@
   <a:extraClrSchemeLst/>
   <a:extLst>
     <a:ext uri="{05A4C25C-085E-4340-85A3-A5531E510DB2}">
-      <thm15:themeFamily xmlns:thm15="http://schemas.microsoft.com/office/thememl/2012/main" xmlns="" name="Circuit" id="{0AC2F7E7-15F5-431C-B2A2-456FE929F56C}" vid="{0911B802-464C-4241-8DD9-B60FF88E379F}"/>
+      <thm15:themeFamily xmlns="" xmlns:thm15="http://schemas.microsoft.com/office/thememl/2012/main" name="Circuit" id="{0AC2F7E7-15F5-431C-B2A2-456FE929F56C}" vid="{0911B802-464C-4241-8DD9-B60FF88E379F}"/>
     </a:ext>
   </a:extLst>
 </a:theme>
@@ -14866,7 +16425,7 @@
   <a:extraClrSchemeLst/>
   <a:extLst>
     <a:ext uri="{05A4C25C-085E-4340-85A3-A5531E510DB2}">
-      <thm15:themeFamily xmlns:thm15="http://schemas.microsoft.com/office/thememl/2012/main" xmlns="" name="Office Theme" id="{62F939B6-93AF-4DB8-9C6B-D6C7DFDC589F}" vid="{4A3C46E8-61CC-4603-A589-7422A47A8E4A}"/>
+      <thm15:themeFamily xmlns="" xmlns:thm15="http://schemas.microsoft.com/office/thememl/2012/main" name="Office Theme" id="{62F939B6-93AF-4DB8-9C6B-D6C7DFDC589F}" vid="{4A3C46E8-61CC-4603-A589-7422A47A8E4A}"/>
     </a:ext>
   </a:extLst>
 </a:theme>

</xml_diff>